<commit_message>
Pushing the latest changes from Azure DevOps
</commit_message>
<xml_diff>
--- a/documentation/Higher.Education.Solution.Packaging.Design & ERD.pptx
+++ b/documentation/Higher.Education.Solution.Packaging.Design & ERD.pptx
@@ -5,23 +5,24 @@
     <p:sldMasterId id="2147483648" r:id="rId4"/>
   </p:sldMasterIdLst>
   <p:notesMasterIdLst>
-    <p:notesMasterId r:id="rId19"/>
+    <p:notesMasterId r:id="rId20"/>
   </p:notesMasterIdLst>
   <p:sldIdLst>
     <p:sldId id="286" r:id="rId5"/>
-    <p:sldId id="288" r:id="rId6"/>
-    <p:sldId id="297" r:id="rId7"/>
-    <p:sldId id="299" r:id="rId8"/>
-    <p:sldId id="335" r:id="rId9"/>
-    <p:sldId id="336" r:id="rId10"/>
-    <p:sldId id="338" r:id="rId11"/>
-    <p:sldId id="301" r:id="rId12"/>
-    <p:sldId id="302" r:id="rId13"/>
-    <p:sldId id="303" r:id="rId14"/>
-    <p:sldId id="304" r:id="rId15"/>
-    <p:sldId id="294" r:id="rId16"/>
-    <p:sldId id="283" r:id="rId17"/>
-    <p:sldId id="341" r:id="rId18"/>
+    <p:sldId id="342" r:id="rId6"/>
+    <p:sldId id="343" r:id="rId7"/>
+    <p:sldId id="344" r:id="rId8"/>
+    <p:sldId id="299" r:id="rId9"/>
+    <p:sldId id="335" r:id="rId10"/>
+    <p:sldId id="336" r:id="rId11"/>
+    <p:sldId id="338" r:id="rId12"/>
+    <p:sldId id="301" r:id="rId13"/>
+    <p:sldId id="302" r:id="rId14"/>
+    <p:sldId id="303" r:id="rId15"/>
+    <p:sldId id="345" r:id="rId16"/>
+    <p:sldId id="346" r:id="rId17"/>
+    <p:sldId id="283" r:id="rId18"/>
+    <p:sldId id="341" r:id="rId19"/>
   </p:sldIdLst>
   <p:sldSz cx="12192000" cy="6858000"/>
   <p:notesSz cx="7315200" cy="9601200"/>
@@ -126,8 +127,9 @@
         <p14:section name="Default Section" id="{39F7B026-CE2F-4224-A6C5-320022AC1AFE}">
           <p14:sldIdLst>
             <p14:sldId id="286"/>
-            <p14:sldId id="288"/>
-            <p14:sldId id="297"/>
+            <p14:sldId id="342"/>
+            <p14:sldId id="343"/>
+            <p14:sldId id="344"/>
             <p14:sldId id="299"/>
             <p14:sldId id="335"/>
             <p14:sldId id="336"/>
@@ -135,8 +137,8 @@
             <p14:sldId id="301"/>
             <p14:sldId id="302"/>
             <p14:sldId id="303"/>
-            <p14:sldId id="304"/>
-            <p14:sldId id="294"/>
+            <p14:sldId id="345"/>
+            <p14:sldId id="346"/>
           </p14:sldIdLst>
         </p14:section>
         <p14:section name="Connection Roles" id="{836CF112-DCC4-4E01-BABC-894534D35B92}">
@@ -185,6 +187,52 @@
         <pc:sldMkLst>
           <pc:docMk/>
           <pc:sldMk cId="3667382784" sldId="341"/>
+        </pc:sldMkLst>
+      </pc:sldChg>
+    </pc:docChg>
+  </pc:docChgLst>
+  <pc:docChgLst>
+    <pc:chgData name="Amandeep Singh" userId="192f9da3-bd5c-42c3-8f41-80b8549e6782" providerId="ADAL" clId="{A19C32C4-A408-446D-A548-EFD04BAD5D0F}"/>
+    <pc:docChg chg="undo custSel addSld delSld modSld modSection">
+      <pc:chgData name="Amandeep Singh" userId="192f9da3-bd5c-42c3-8f41-80b8549e6782" providerId="ADAL" clId="{A19C32C4-A408-446D-A548-EFD04BAD5D0F}" dt="2022-04-07T21:27:56.743" v="6" actId="2696"/>
+      <pc:docMkLst>
+        <pc:docMk/>
+      </pc:docMkLst>
+      <pc:sldChg chg="addSp delSp modSp add del mod">
+        <pc:chgData name="Amandeep Singh" userId="192f9da3-bd5c-42c3-8f41-80b8549e6782" providerId="ADAL" clId="{A19C32C4-A408-446D-A548-EFD04BAD5D0F}" dt="2022-04-07T21:27:50.416" v="5" actId="2696"/>
+        <pc:sldMkLst>
+          <pc:docMk/>
+          <pc:sldMk cId="3226864652" sldId="302"/>
+        </pc:sldMkLst>
+        <pc:graphicFrameChg chg="del modGraphic">
+          <ac:chgData name="Amandeep Singh" userId="192f9da3-bd5c-42c3-8f41-80b8549e6782" providerId="ADAL" clId="{A19C32C4-A408-446D-A548-EFD04BAD5D0F}" dt="2022-04-07T21:27:25.317" v="1" actId="478"/>
+          <ac:graphicFrameMkLst>
+            <pc:docMk/>
+            <pc:sldMk cId="3226864652" sldId="302"/>
+            <ac:graphicFrameMk id="2" creationId="{8B574959-82AC-A5C7-E4B2-C39FDF201BD6}"/>
+          </ac:graphicFrameMkLst>
+        </pc:graphicFrameChg>
+        <pc:graphicFrameChg chg="add">
+          <ac:chgData name="Amandeep Singh" userId="192f9da3-bd5c-42c3-8f41-80b8549e6782" providerId="ADAL" clId="{A19C32C4-A408-446D-A548-EFD04BAD5D0F}" dt="2022-04-07T21:27:26.231" v="2" actId="22"/>
+          <ac:graphicFrameMkLst>
+            <pc:docMk/>
+            <pc:sldMk cId="3226864652" sldId="302"/>
+            <ac:graphicFrameMk id="3" creationId="{045D69A4-5BFE-2217-70EF-D3A6196A93D9}"/>
+          </ac:graphicFrameMkLst>
+        </pc:graphicFrameChg>
+      </pc:sldChg>
+      <pc:sldChg chg="del">
+        <pc:chgData name="Amandeep Singh" userId="192f9da3-bd5c-42c3-8f41-80b8549e6782" providerId="ADAL" clId="{A19C32C4-A408-446D-A548-EFD04BAD5D0F}" dt="2022-04-07T21:27:34.110" v="3" actId="2696"/>
+        <pc:sldMkLst>
+          <pc:docMk/>
+          <pc:sldMk cId="327038683" sldId="347"/>
+        </pc:sldMkLst>
+      </pc:sldChg>
+      <pc:sldChg chg="del">
+        <pc:chgData name="Amandeep Singh" userId="192f9da3-bd5c-42c3-8f41-80b8549e6782" providerId="ADAL" clId="{A19C32C4-A408-446D-A548-EFD04BAD5D0F}" dt="2022-04-07T21:27:56.743" v="6" actId="2696"/>
+        <pc:sldMkLst>
+          <pc:docMk/>
+          <pc:sldMk cId="714386767" sldId="348"/>
         </pc:sldMkLst>
       </pc:sldChg>
     </pc:docChg>
@@ -274,7 +322,7 @@
           <a:p>
             <a:fld id="{6FB01639-DAD8-417F-B6AC-D42D39109840}" type="datetimeFigureOut">
               <a:rPr lang="en-US" smtClean="0"/>
-              <a:t>8/9/2021</a:t>
+              <a:t>4/7/2022</a:t>
             </a:fld>
             <a:endParaRPr lang="en-US"/>
           </a:p>
@@ -772,7 +820,7 @@
           <a:p>
             <a:fld id="{63DB6815-4F29-43CA-B3B6-BC8BFF87DA5B}" type="datetimeFigureOut">
               <a:rPr lang="en-US" smtClean="0"/>
-              <a:t>8/9/2021</a:t>
+              <a:t>4/7/2022</a:t>
             </a:fld>
             <a:endParaRPr lang="en-US"/>
           </a:p>
@@ -970,7 +1018,7 @@
           <a:p>
             <a:fld id="{63DB6815-4F29-43CA-B3B6-BC8BFF87DA5B}" type="datetimeFigureOut">
               <a:rPr lang="en-US" smtClean="0"/>
-              <a:t>8/9/2021</a:t>
+              <a:t>4/7/2022</a:t>
             </a:fld>
             <a:endParaRPr lang="en-US"/>
           </a:p>
@@ -1178,7 +1226,7 @@
           <a:p>
             <a:fld id="{63DB6815-4F29-43CA-B3B6-BC8BFF87DA5B}" type="datetimeFigureOut">
               <a:rPr lang="en-US" smtClean="0"/>
-              <a:t>8/9/2021</a:t>
+              <a:t>4/7/2022</a:t>
             </a:fld>
             <a:endParaRPr lang="en-US"/>
           </a:p>
@@ -1376,7 +1424,7 @@
           <a:p>
             <a:fld id="{63DB6815-4F29-43CA-B3B6-BC8BFF87DA5B}" type="datetimeFigureOut">
               <a:rPr lang="en-US" smtClean="0"/>
-              <a:t>8/9/2021</a:t>
+              <a:t>4/7/2022</a:t>
             </a:fld>
             <a:endParaRPr lang="en-US"/>
           </a:p>
@@ -1651,7 +1699,7 @@
           <a:p>
             <a:fld id="{63DB6815-4F29-43CA-B3B6-BC8BFF87DA5B}" type="datetimeFigureOut">
               <a:rPr lang="en-US" smtClean="0"/>
-              <a:t>8/9/2021</a:t>
+              <a:t>4/7/2022</a:t>
             </a:fld>
             <a:endParaRPr lang="en-US"/>
           </a:p>
@@ -1916,7 +1964,7 @@
           <a:p>
             <a:fld id="{63DB6815-4F29-43CA-B3B6-BC8BFF87DA5B}" type="datetimeFigureOut">
               <a:rPr lang="en-US" smtClean="0"/>
-              <a:t>8/9/2021</a:t>
+              <a:t>4/7/2022</a:t>
             </a:fld>
             <a:endParaRPr lang="en-US"/>
           </a:p>
@@ -2328,7 +2376,7 @@
           <a:p>
             <a:fld id="{63DB6815-4F29-43CA-B3B6-BC8BFF87DA5B}" type="datetimeFigureOut">
               <a:rPr lang="en-US" smtClean="0"/>
-              <a:t>8/9/2021</a:t>
+              <a:t>4/7/2022</a:t>
             </a:fld>
             <a:endParaRPr lang="en-US"/>
           </a:p>
@@ -2469,7 +2517,7 @@
           <a:p>
             <a:fld id="{63DB6815-4F29-43CA-B3B6-BC8BFF87DA5B}" type="datetimeFigureOut">
               <a:rPr lang="en-US" smtClean="0"/>
-              <a:t>8/9/2021</a:t>
+              <a:t>4/7/2022</a:t>
             </a:fld>
             <a:endParaRPr lang="en-US"/>
           </a:p>
@@ -2582,7 +2630,7 @@
           <a:p>
             <a:fld id="{63DB6815-4F29-43CA-B3B6-BC8BFF87DA5B}" type="datetimeFigureOut">
               <a:rPr lang="en-US" smtClean="0"/>
-              <a:t>8/9/2021</a:t>
+              <a:t>4/7/2022</a:t>
             </a:fld>
             <a:endParaRPr lang="en-US"/>
           </a:p>
@@ -2893,7 +2941,7 @@
           <a:p>
             <a:fld id="{63DB6815-4F29-43CA-B3B6-BC8BFF87DA5B}" type="datetimeFigureOut">
               <a:rPr lang="en-US" smtClean="0"/>
-              <a:t>8/9/2021</a:t>
+              <a:t>4/7/2022</a:t>
             </a:fld>
             <a:endParaRPr lang="en-US"/>
           </a:p>
@@ -3181,7 +3229,7 @@
           <a:p>
             <a:fld id="{63DB6815-4F29-43CA-B3B6-BC8BFF87DA5B}" type="datetimeFigureOut">
               <a:rPr lang="en-US" smtClean="0"/>
-              <a:t>8/9/2021</a:t>
+              <a:t>4/7/2022</a:t>
             </a:fld>
             <a:endParaRPr lang="en-US"/>
           </a:p>
@@ -3422,7 +3470,7 @@
           <a:p>
             <a:fld id="{63DB6815-4F29-43CA-B3B6-BC8BFF87DA5B}" type="datetimeFigureOut">
               <a:rPr lang="en-US" smtClean="0"/>
-              <a:t>8/9/2021</a:t>
+              <a:t>4/7/2022</a:t>
             </a:fld>
             <a:endParaRPr lang="en-US"/>
           </a:p>
@@ -4180,7 +4228,7 @@
                 <a:latin typeface="Segoe UI" panose="020B0502040204020203" pitchFamily="34" charset="0"/>
                 <a:cs typeface="Segoe UI" panose="020B0502040204020203" pitchFamily="34" charset="0"/>
               </a:rPr>
-              <a:t>Education Accelerator Common Common</a:t>
+              <a:t>Education Accelerator Common</a:t>
             </a:r>
           </a:p>
         </p:txBody>
@@ -4232,7 +4280,7 @@
                 <a:latin typeface="Segoe UI" panose="020B0502040204020203" pitchFamily="34" charset="0"/>
                 <a:cs typeface="Segoe UI" panose="020B0502040204020203" pitchFamily="34" charset="0"/>
               </a:rPr>
-              <a:t>Dynamics 365 Higher Education Accelerator Common Canvas Model Apps</a:t>
+              <a:t>Dynamics 365 Higher Education Accelerator Canvas Model Apps</a:t>
             </a:r>
           </a:p>
         </p:txBody>
@@ -4284,7 +4332,7 @@
                 <a:latin typeface="Segoe UI" panose="020B0502040204020203" pitchFamily="34" charset="0"/>
                 <a:cs typeface="Segoe UI" panose="020B0502040204020203" pitchFamily="34" charset="0"/>
               </a:rPr>
-              <a:t>Dynamics 365 Higher Education Accelerator Common</a:t>
+              <a:t>Dynamics 365 Higher Education Accelerator</a:t>
             </a:r>
           </a:p>
         </p:txBody>
@@ -4504,6 +4552,751 @@
         <p:spPr>
           <a:xfrm flipH="1">
             <a:off x="348339" y="457163"/>
+            <a:ext cx="11760533" cy="523220"/>
+          </a:xfrm>
+          <a:prstGeom prst="rect">
+            <a:avLst/>
+          </a:prstGeom>
+          <a:noFill/>
+        </p:spPr>
+        <p:txBody>
+          <a:bodyPr wrap="square" rtlCol="0">
+            <a:spAutoFit/>
+          </a:bodyPr>
+          <a:lstStyle/>
+          <a:p>
+            <a:r>
+              <a:rPr lang="en-US" sz="2800" dirty="0">
+                <a:latin typeface="Segoe UI" panose="020B0502040204020203" pitchFamily="34" charset="0"/>
+                <a:cs typeface="Segoe UI" panose="020B0502040204020203" pitchFamily="34" charset="0"/>
+              </a:rPr>
+              <a:t>Dynamics 365 Higher Education Accelerator -&gt; Enriched Entities</a:t>
+            </a:r>
+          </a:p>
+        </p:txBody>
+      </p:sp>
+      <p:sp>
+        <p:nvSpPr>
+          <p:cNvPr id="15" name="Arrow: Right 14">
+            <a:extLst>
+              <a:ext uri="{FF2B5EF4-FFF2-40B4-BE49-F238E27FC236}">
+                <a16:creationId xmlns:a16="http://schemas.microsoft.com/office/drawing/2014/main" id="{AAB858B2-CD60-4C31-9BDB-CD6561A5C3FE}"/>
+              </a:ext>
+            </a:extLst>
+          </p:cNvPr>
+          <p:cNvSpPr/>
+          <p:nvPr/>
+        </p:nvSpPr>
+        <p:spPr>
+          <a:xfrm>
+            <a:off x="6035040" y="3198859"/>
+            <a:ext cx="978408" cy="484632"/>
+          </a:xfrm>
+          <a:prstGeom prst="rightArrow">
+            <a:avLst/>
+          </a:prstGeom>
+          <a:ln w="28575">
+            <a:solidFill>
+              <a:srgbClr val="FFC000"/>
+            </a:solidFill>
+          </a:ln>
+        </p:spPr>
+        <p:style>
+          <a:lnRef idx="2">
+            <a:schemeClr val="accent1">
+              <a:shade val="50000"/>
+            </a:schemeClr>
+          </a:lnRef>
+          <a:fillRef idx="1">
+            <a:schemeClr val="accent1"/>
+          </a:fillRef>
+          <a:effectRef idx="0">
+            <a:schemeClr val="accent1"/>
+          </a:effectRef>
+          <a:fontRef idx="minor">
+            <a:schemeClr val="lt1"/>
+          </a:fontRef>
+        </p:style>
+        <p:txBody>
+          <a:bodyPr rtlCol="0" anchor="ctr"/>
+          <a:lstStyle/>
+          <a:p>
+            <a:pPr algn="ctr"/>
+            <a:endParaRPr lang="en-US"/>
+          </a:p>
+        </p:txBody>
+      </p:sp>
+      <p:grpSp>
+        <p:nvGrpSpPr>
+          <p:cNvPr id="12" name="Group 11">
+            <a:extLst>
+              <a:ext uri="{FF2B5EF4-FFF2-40B4-BE49-F238E27FC236}">
+                <a16:creationId xmlns:a16="http://schemas.microsoft.com/office/drawing/2014/main" id="{E152B160-02BA-403D-BB79-DF576E2F2783}"/>
+              </a:ext>
+            </a:extLst>
+          </p:cNvPr>
+          <p:cNvGrpSpPr/>
+          <p:nvPr/>
+        </p:nvGrpSpPr>
+        <p:grpSpPr>
+          <a:xfrm>
+            <a:off x="865920" y="2558714"/>
+            <a:ext cx="5031914" cy="2102360"/>
+            <a:chOff x="865920" y="2230240"/>
+            <a:chExt cx="5031914" cy="2102360"/>
+          </a:xfrm>
+        </p:grpSpPr>
+        <p:sp>
+          <p:nvSpPr>
+            <p:cNvPr id="13" name="Rectangle 12">
+              <a:extLst>
+                <a:ext uri="{FF2B5EF4-FFF2-40B4-BE49-F238E27FC236}">
+                  <a16:creationId xmlns:a16="http://schemas.microsoft.com/office/drawing/2014/main" id="{21A2AF15-E594-40C8-9A28-537E44175916}"/>
+                </a:ext>
+              </a:extLst>
+            </p:cNvPr>
+            <p:cNvSpPr/>
+            <p:nvPr/>
+          </p:nvSpPr>
+          <p:spPr>
+            <a:xfrm>
+              <a:off x="865924" y="4038736"/>
+              <a:ext cx="5031910" cy="293864"/>
+            </a:xfrm>
+            <a:prstGeom prst="rect">
+              <a:avLst/>
+            </a:prstGeom>
+            <a:solidFill>
+              <a:srgbClr val="FFEFBD"/>
+            </a:solidFill>
+          </p:spPr>
+          <p:style>
+            <a:lnRef idx="2">
+              <a:schemeClr val="accent4">
+                <a:shade val="50000"/>
+              </a:schemeClr>
+            </a:lnRef>
+            <a:fillRef idx="1">
+              <a:schemeClr val="accent4"/>
+            </a:fillRef>
+            <a:effectRef idx="0">
+              <a:schemeClr val="accent4"/>
+            </a:effectRef>
+            <a:fontRef idx="minor">
+              <a:schemeClr val="lt1"/>
+            </a:fontRef>
+          </p:style>
+          <p:txBody>
+            <a:bodyPr rtlCol="0" anchor="ctr"/>
+            <a:lstStyle/>
+            <a:p>
+              <a:pPr algn="ctr"/>
+              <a:r>
+                <a:rPr lang="en-US" sz="800" dirty="0">
+                  <a:solidFill>
+                    <a:schemeClr val="tx1"/>
+                  </a:solidFill>
+                  <a:latin typeface="Segoe UI" panose="020B0502040204020203" pitchFamily="34" charset="0"/>
+                  <a:cs typeface="Segoe UI" panose="020B0502040204020203" pitchFamily="34" charset="0"/>
+                </a:rPr>
+                <a:t>CDM Common</a:t>
+              </a:r>
+            </a:p>
+          </p:txBody>
+        </p:sp>
+        <p:sp>
+          <p:nvSpPr>
+            <p:cNvPr id="23" name="Rectangle 22">
+              <a:extLst>
+                <a:ext uri="{FF2B5EF4-FFF2-40B4-BE49-F238E27FC236}">
+                  <a16:creationId xmlns:a16="http://schemas.microsoft.com/office/drawing/2014/main" id="{1D8BEC6A-9048-4997-BBA2-04EAF5EF37C0}"/>
+                </a:ext>
+              </a:extLst>
+            </p:cNvPr>
+            <p:cNvSpPr/>
+            <p:nvPr/>
+          </p:nvSpPr>
+          <p:spPr>
+            <a:xfrm>
+              <a:off x="865921" y="3677036"/>
+              <a:ext cx="5031913" cy="293864"/>
+            </a:xfrm>
+            <a:prstGeom prst="rect">
+              <a:avLst/>
+            </a:prstGeom>
+            <a:solidFill>
+              <a:srgbClr val="CFDBF0"/>
+            </a:solidFill>
+          </p:spPr>
+          <p:style>
+            <a:lnRef idx="2">
+              <a:schemeClr val="accent1">
+                <a:shade val="50000"/>
+              </a:schemeClr>
+            </a:lnRef>
+            <a:fillRef idx="1">
+              <a:schemeClr val="accent1"/>
+            </a:fillRef>
+            <a:effectRef idx="0">
+              <a:schemeClr val="accent1"/>
+            </a:effectRef>
+            <a:fontRef idx="minor">
+              <a:schemeClr val="lt1"/>
+            </a:fontRef>
+          </p:style>
+          <p:txBody>
+            <a:bodyPr rtlCol="0" anchor="ctr"/>
+            <a:lstStyle/>
+            <a:p>
+              <a:pPr algn="ctr"/>
+              <a:r>
+                <a:rPr lang="en-US" sz="800" dirty="0">
+                  <a:solidFill>
+                    <a:schemeClr val="tx1"/>
+                  </a:solidFill>
+                  <a:latin typeface="Segoe UI" panose="020B0502040204020203" pitchFamily="34" charset="0"/>
+                  <a:cs typeface="Segoe UI" panose="020B0502040204020203" pitchFamily="34" charset="0"/>
+                </a:rPr>
+                <a:t>Education Accelerator Common</a:t>
+              </a:r>
+            </a:p>
+          </p:txBody>
+        </p:sp>
+        <p:sp>
+          <p:nvSpPr>
+            <p:cNvPr id="24" name="Rectangle 23">
+              <a:extLst>
+                <a:ext uri="{FF2B5EF4-FFF2-40B4-BE49-F238E27FC236}">
+                  <a16:creationId xmlns:a16="http://schemas.microsoft.com/office/drawing/2014/main" id="{A1652B8E-DA30-4222-9CAA-4648E414D287}"/>
+                </a:ext>
+              </a:extLst>
+            </p:cNvPr>
+            <p:cNvSpPr/>
+            <p:nvPr/>
+          </p:nvSpPr>
+          <p:spPr>
+            <a:xfrm>
+              <a:off x="3488769" y="2591098"/>
+              <a:ext cx="2409063" cy="293864"/>
+            </a:xfrm>
+            <a:prstGeom prst="rect">
+              <a:avLst/>
+            </a:prstGeom>
+            <a:solidFill>
+              <a:srgbClr val="CFDBF0"/>
+            </a:solidFill>
+          </p:spPr>
+          <p:style>
+            <a:lnRef idx="2">
+              <a:schemeClr val="accent1">
+                <a:shade val="50000"/>
+              </a:schemeClr>
+            </a:lnRef>
+            <a:fillRef idx="1">
+              <a:schemeClr val="accent1"/>
+            </a:fillRef>
+            <a:effectRef idx="0">
+              <a:schemeClr val="accent1"/>
+            </a:effectRef>
+            <a:fontRef idx="minor">
+              <a:schemeClr val="lt1"/>
+            </a:fontRef>
+          </p:style>
+          <p:txBody>
+            <a:bodyPr rtlCol="0" anchor="ctr"/>
+            <a:lstStyle/>
+            <a:p>
+              <a:pPr algn="ctr"/>
+              <a:r>
+                <a:rPr lang="en-US" sz="800" dirty="0">
+                  <a:solidFill>
+                    <a:schemeClr val="tx1"/>
+                  </a:solidFill>
+                  <a:latin typeface="Segoe UI" panose="020B0502040204020203" pitchFamily="34" charset="0"/>
+                  <a:cs typeface="Segoe UI" panose="020B0502040204020203" pitchFamily="34" charset="0"/>
+                </a:rPr>
+                <a:t>Dynamics 365 Higher Education Accelerator Canvas Model Apps</a:t>
+              </a:r>
+            </a:p>
+          </p:txBody>
+        </p:sp>
+        <p:sp>
+          <p:nvSpPr>
+            <p:cNvPr id="25" name="Rectangle 24">
+              <a:extLst>
+                <a:ext uri="{FF2B5EF4-FFF2-40B4-BE49-F238E27FC236}">
+                  <a16:creationId xmlns:a16="http://schemas.microsoft.com/office/drawing/2014/main" id="{6E1D1594-8CC8-45AB-901A-AA65AAB0DF84}"/>
+                </a:ext>
+              </a:extLst>
+            </p:cNvPr>
+            <p:cNvSpPr/>
+            <p:nvPr/>
+          </p:nvSpPr>
+          <p:spPr>
+            <a:xfrm>
+              <a:off x="865921" y="2953638"/>
+              <a:ext cx="5031911" cy="293864"/>
+            </a:xfrm>
+            <a:prstGeom prst="rect">
+              <a:avLst/>
+            </a:prstGeom>
+          </p:spPr>
+          <p:style>
+            <a:lnRef idx="2">
+              <a:schemeClr val="accent1">
+                <a:shade val="50000"/>
+              </a:schemeClr>
+            </a:lnRef>
+            <a:fillRef idx="1">
+              <a:schemeClr val="accent1"/>
+            </a:fillRef>
+            <a:effectRef idx="0">
+              <a:schemeClr val="accent1"/>
+            </a:effectRef>
+            <a:fontRef idx="minor">
+              <a:schemeClr val="lt1"/>
+            </a:fontRef>
+          </p:style>
+          <p:txBody>
+            <a:bodyPr rtlCol="0" anchor="ctr"/>
+            <a:lstStyle/>
+            <a:p>
+              <a:pPr algn="ctr"/>
+              <a:r>
+                <a:rPr lang="en-US" sz="800" dirty="0">
+                  <a:solidFill>
+                    <a:schemeClr val="bg1"/>
+                  </a:solidFill>
+                  <a:latin typeface="Segoe UI" panose="020B0502040204020203" pitchFamily="34" charset="0"/>
+                  <a:cs typeface="Segoe UI" panose="020B0502040204020203" pitchFamily="34" charset="0"/>
+                </a:rPr>
+                <a:t>Dynamics 365 Higher Education Accelerator</a:t>
+              </a:r>
+            </a:p>
+          </p:txBody>
+        </p:sp>
+        <p:sp>
+          <p:nvSpPr>
+            <p:cNvPr id="26" name="Rectangle 25">
+              <a:extLst>
+                <a:ext uri="{FF2B5EF4-FFF2-40B4-BE49-F238E27FC236}">
+                  <a16:creationId xmlns:a16="http://schemas.microsoft.com/office/drawing/2014/main" id="{1E8949F9-B926-4C8D-AA49-CD692D5760F1}"/>
+                </a:ext>
+              </a:extLst>
+            </p:cNvPr>
+            <p:cNvSpPr/>
+            <p:nvPr/>
+          </p:nvSpPr>
+          <p:spPr>
+            <a:xfrm>
+              <a:off x="865922" y="2230240"/>
+              <a:ext cx="2535568" cy="293864"/>
+            </a:xfrm>
+            <a:prstGeom prst="rect">
+              <a:avLst/>
+            </a:prstGeom>
+            <a:solidFill>
+              <a:srgbClr val="CFDBF0"/>
+            </a:solidFill>
+          </p:spPr>
+          <p:style>
+            <a:lnRef idx="2">
+              <a:schemeClr val="accent1">
+                <a:shade val="50000"/>
+              </a:schemeClr>
+            </a:lnRef>
+            <a:fillRef idx="1">
+              <a:schemeClr val="accent1"/>
+            </a:fillRef>
+            <a:effectRef idx="0">
+              <a:schemeClr val="accent1"/>
+            </a:effectRef>
+            <a:fontRef idx="minor">
+              <a:schemeClr val="lt1"/>
+            </a:fontRef>
+          </p:style>
+          <p:txBody>
+            <a:bodyPr rtlCol="0" anchor="ctr"/>
+            <a:lstStyle/>
+            <a:p>
+              <a:pPr algn="ctr"/>
+              <a:endParaRPr lang="en-US" sz="800" dirty="0">
+                <a:solidFill>
+                  <a:schemeClr val="tx1"/>
+                </a:solidFill>
+                <a:latin typeface="Segoe UI" panose="020B0502040204020203" pitchFamily="34" charset="0"/>
+                <a:cs typeface="Segoe UI" panose="020B0502040204020203" pitchFamily="34" charset="0"/>
+              </a:endParaRPr>
+            </a:p>
+            <a:p>
+              <a:pPr algn="ctr"/>
+              <a:r>
+                <a:rPr lang="en-US" sz="800" dirty="0">
+                  <a:solidFill>
+                    <a:schemeClr val="tx1"/>
+                  </a:solidFill>
+                  <a:latin typeface="Segoe UI" panose="020B0502040204020203" pitchFamily="34" charset="0"/>
+                  <a:cs typeface="Segoe UI" panose="020B0502040204020203" pitchFamily="34" charset="0"/>
+                </a:rPr>
+                <a:t>Dynamics 365 Higher Ed Portal</a:t>
+              </a:r>
+            </a:p>
+            <a:p>
+              <a:pPr algn="ctr"/>
+              <a:endParaRPr lang="en-US" sz="800" dirty="0">
+                <a:solidFill>
+                  <a:schemeClr val="tx1"/>
+                </a:solidFill>
+                <a:latin typeface="Segoe UI" panose="020B0502040204020203" pitchFamily="34" charset="0"/>
+                <a:cs typeface="Segoe UI" panose="020B0502040204020203" pitchFamily="34" charset="0"/>
+              </a:endParaRPr>
+            </a:p>
+          </p:txBody>
+        </p:sp>
+        <p:sp>
+          <p:nvSpPr>
+            <p:cNvPr id="27" name="Rectangle 26">
+              <a:extLst>
+                <a:ext uri="{FF2B5EF4-FFF2-40B4-BE49-F238E27FC236}">
+                  <a16:creationId xmlns:a16="http://schemas.microsoft.com/office/drawing/2014/main" id="{89C97A68-203D-46AC-88F8-8C03ED8E4BFB}"/>
+                </a:ext>
+              </a:extLst>
+            </p:cNvPr>
+            <p:cNvSpPr/>
+            <p:nvPr/>
+          </p:nvSpPr>
+          <p:spPr>
+            <a:xfrm>
+              <a:off x="865921" y="2591939"/>
+              <a:ext cx="2535570" cy="293864"/>
+            </a:xfrm>
+            <a:prstGeom prst="rect">
+              <a:avLst/>
+            </a:prstGeom>
+            <a:solidFill>
+              <a:srgbClr val="FFEFBD"/>
+            </a:solidFill>
+          </p:spPr>
+          <p:style>
+            <a:lnRef idx="2">
+              <a:schemeClr val="accent4">
+                <a:shade val="50000"/>
+              </a:schemeClr>
+            </a:lnRef>
+            <a:fillRef idx="1">
+              <a:schemeClr val="accent4"/>
+            </a:fillRef>
+            <a:effectRef idx="0">
+              <a:schemeClr val="accent4"/>
+            </a:effectRef>
+            <a:fontRef idx="minor">
+              <a:schemeClr val="lt1"/>
+            </a:fontRef>
+          </p:style>
+          <p:txBody>
+            <a:bodyPr rtlCol="0" anchor="ctr"/>
+            <a:lstStyle/>
+            <a:p>
+              <a:pPr algn="ctr"/>
+              <a:r>
+                <a:rPr lang="en-US" sz="800" dirty="0">
+                  <a:solidFill>
+                    <a:schemeClr val="tx1"/>
+                  </a:solidFill>
+                  <a:latin typeface="Segoe UI" panose="020B0502040204020203" pitchFamily="34" charset="0"/>
+                  <a:cs typeface="Segoe UI" panose="020B0502040204020203" pitchFamily="34" charset="0"/>
+                </a:rPr>
+                <a:t>PowerApps Portal</a:t>
+              </a:r>
+            </a:p>
+          </p:txBody>
+        </p:sp>
+        <p:sp>
+          <p:nvSpPr>
+            <p:cNvPr id="28" name="Rectangle 27">
+              <a:extLst>
+                <a:ext uri="{FF2B5EF4-FFF2-40B4-BE49-F238E27FC236}">
+                  <a16:creationId xmlns:a16="http://schemas.microsoft.com/office/drawing/2014/main" id="{75EE3904-4ADB-4FC1-B45E-1A4FC08106E1}"/>
+                </a:ext>
+              </a:extLst>
+            </p:cNvPr>
+            <p:cNvSpPr/>
+            <p:nvPr/>
+          </p:nvSpPr>
+          <p:spPr>
+            <a:xfrm>
+              <a:off x="865920" y="3315337"/>
+              <a:ext cx="5031911" cy="293864"/>
+            </a:xfrm>
+            <a:prstGeom prst="rect">
+              <a:avLst/>
+            </a:prstGeom>
+            <a:solidFill>
+              <a:srgbClr val="CFDBF0"/>
+            </a:solidFill>
+          </p:spPr>
+          <p:style>
+            <a:lnRef idx="2">
+              <a:schemeClr val="accent1">
+                <a:shade val="50000"/>
+              </a:schemeClr>
+            </a:lnRef>
+            <a:fillRef idx="1">
+              <a:schemeClr val="accent1"/>
+            </a:fillRef>
+            <a:effectRef idx="0">
+              <a:schemeClr val="accent1"/>
+            </a:effectRef>
+            <a:fontRef idx="minor">
+              <a:schemeClr val="lt1"/>
+            </a:fontRef>
+          </p:style>
+          <p:txBody>
+            <a:bodyPr rtlCol="0" anchor="ctr"/>
+            <a:lstStyle/>
+            <a:p>
+              <a:pPr algn="ctr"/>
+              <a:r>
+                <a:rPr lang="en-US" sz="800" dirty="0">
+                  <a:solidFill>
+                    <a:schemeClr val="tx1"/>
+                  </a:solidFill>
+                  <a:latin typeface="Segoe UI" panose="020B0502040204020203" pitchFamily="34" charset="0"/>
+                  <a:cs typeface="Segoe UI" panose="020B0502040204020203" pitchFamily="34" charset="0"/>
+                </a:rPr>
+                <a:t>Education Accelerator Connection Roles</a:t>
+              </a:r>
+            </a:p>
+          </p:txBody>
+        </p:sp>
+      </p:grpSp>
+      <p:graphicFrame>
+        <p:nvGraphicFramePr>
+          <p:cNvPr id="3" name="Table 35">
+            <a:extLst>
+              <a:ext uri="{FF2B5EF4-FFF2-40B4-BE49-F238E27FC236}">
+                <a16:creationId xmlns:a16="http://schemas.microsoft.com/office/drawing/2014/main" id="{045D69A4-5BFE-2217-70EF-D3A6196A93D9}"/>
+              </a:ext>
+            </a:extLst>
+          </p:cNvPr>
+          <p:cNvGraphicFramePr>
+            <a:graphicFrameLocks noGrp="1"/>
+          </p:cNvGraphicFramePr>
+          <p:nvPr>
+            <p:extLst>
+              <p:ext uri="{D42A27DB-BD31-4B8C-83A1-F6EECF244321}">
+                <p14:modId xmlns:p14="http://schemas.microsoft.com/office/powerpoint/2010/main" val="3771051231"/>
+              </p:ext>
+            </p:extLst>
+          </p:nvPr>
+        </p:nvGraphicFramePr>
+        <p:xfrm>
+          <a:off x="7150654" y="2617970"/>
+          <a:ext cx="4852660" cy="1630680"/>
+        </p:xfrm>
+        <a:graphic>
+          <a:graphicData uri="http://schemas.openxmlformats.org/drawingml/2006/table">
+            <a:tbl>
+              <a:tblPr firstRow="1" bandRow="1">
+                <a:tableStyleId>{B301B821-A1FF-4177-AEE7-76D212191A09}</a:tableStyleId>
+              </a:tblPr>
+              <a:tblGrid>
+                <a:gridCol w="2254603">
+                  <a:extLst>
+                    <a:ext uri="{9D8B030D-6E8A-4147-A177-3AD203B41FA5}">
+                      <a16:colId xmlns:a16="http://schemas.microsoft.com/office/drawing/2014/main" val="832068167"/>
+                    </a:ext>
+                  </a:extLst>
+                </a:gridCol>
+                <a:gridCol w="2598057">
+                  <a:extLst>
+                    <a:ext uri="{9D8B030D-6E8A-4147-A177-3AD203B41FA5}">
+                      <a16:colId xmlns:a16="http://schemas.microsoft.com/office/drawing/2014/main" val="2702330717"/>
+                    </a:ext>
+                  </a:extLst>
+                </a:gridCol>
+              </a:tblGrid>
+              <a:tr h="370840">
+                <a:tc>
+                  <a:txBody>
+                    <a:bodyPr/>
+                    <a:lstStyle/>
+                    <a:p>
+                      <a:r>
+                        <a:rPr lang="en-US" sz="1400" dirty="0"/>
+                        <a:t>Entity Name</a:t>
+                      </a:r>
+                    </a:p>
+                  </a:txBody>
+                  <a:tcPr/>
+                </a:tc>
+                <a:tc>
+                  <a:txBody>
+                    <a:bodyPr/>
+                    <a:lstStyle/>
+                    <a:p>
+                      <a:r>
+                        <a:rPr lang="en-US" sz="1400" dirty="0"/>
+                        <a:t>Source</a:t>
+                      </a:r>
+                    </a:p>
+                  </a:txBody>
+                  <a:tcPr/>
+                </a:tc>
+                <a:extLst>
+                  <a:ext uri="{0D108BD9-81ED-4DB2-BD59-A6C34878D82A}">
+                    <a16:rowId xmlns:a16="http://schemas.microsoft.com/office/drawing/2014/main" val="897896226"/>
+                  </a:ext>
+                </a:extLst>
+              </a:tr>
+              <a:tr h="370840">
+                <a:tc>
+                  <a:txBody>
+                    <a:bodyPr/>
+                    <a:lstStyle/>
+                    <a:p>
+                      <a:r>
+                        <a:rPr lang="en-US" sz="1400" dirty="0"/>
+                        <a:t>Account</a:t>
+                      </a:r>
+                    </a:p>
+                  </a:txBody>
+                  <a:tcPr/>
+                </a:tc>
+                <a:tc>
+                  <a:txBody>
+                    <a:bodyPr/>
+                    <a:lstStyle/>
+                    <a:p>
+                      <a:r>
+                        <a:rPr lang="en-US" sz="1400" dirty="0"/>
+                        <a:t>Common CDM</a:t>
+                      </a:r>
+                    </a:p>
+                  </a:txBody>
+                  <a:tcPr/>
+                </a:tc>
+                <a:extLst>
+                  <a:ext uri="{0D108BD9-81ED-4DB2-BD59-A6C34878D82A}">
+                    <a16:rowId xmlns:a16="http://schemas.microsoft.com/office/drawing/2014/main" val="2241325783"/>
+                  </a:ext>
+                </a:extLst>
+              </a:tr>
+              <a:tr h="370840">
+                <a:tc>
+                  <a:txBody>
+                    <a:bodyPr/>
+                    <a:lstStyle/>
+                    <a:p>
+                      <a:r>
+                        <a:rPr lang="en-US" sz="1400" dirty="0"/>
+                        <a:t>Contact</a:t>
+                      </a:r>
+                    </a:p>
+                  </a:txBody>
+                  <a:tcPr/>
+                </a:tc>
+                <a:tc>
+                  <a:txBody>
+                    <a:bodyPr/>
+                    <a:lstStyle/>
+                    <a:p>
+                      <a:r>
+                        <a:rPr lang="en-US" sz="1400" dirty="0"/>
+                        <a:t>Common CDM</a:t>
+                      </a:r>
+                    </a:p>
+                  </a:txBody>
+                  <a:tcPr/>
+                </a:tc>
+                <a:extLst>
+                  <a:ext uri="{0D108BD9-81ED-4DB2-BD59-A6C34878D82A}">
+                    <a16:rowId xmlns:a16="http://schemas.microsoft.com/office/drawing/2014/main" val="2508927978"/>
+                  </a:ext>
+                </a:extLst>
+              </a:tr>
+              <a:tr h="370840">
+                <a:tc>
+                  <a:txBody>
+                    <a:bodyPr/>
+                    <a:lstStyle/>
+                    <a:p>
+                      <a:r>
+                        <a:rPr lang="en-US" sz="1400" dirty="0"/>
+                        <a:t>Recommended Student Resource</a:t>
+                      </a:r>
+                    </a:p>
+                  </a:txBody>
+                  <a:tcPr/>
+                </a:tc>
+                <a:tc>
+                  <a:txBody>
+                    <a:bodyPr/>
+                    <a:lstStyle/>
+                    <a:p>
+                      <a:r>
+                        <a:rPr lang="en-US" sz="1400" dirty="0"/>
+                        <a:t>Education Accelerator Common</a:t>
+                      </a:r>
+                    </a:p>
+                  </a:txBody>
+                  <a:tcPr/>
+                </a:tc>
+                <a:extLst>
+                  <a:ext uri="{0D108BD9-81ED-4DB2-BD59-A6C34878D82A}">
+                    <a16:rowId xmlns:a16="http://schemas.microsoft.com/office/drawing/2014/main" val="3838149768"/>
+                  </a:ext>
+                </a:extLst>
+              </a:tr>
+            </a:tbl>
+          </a:graphicData>
+        </a:graphic>
+      </p:graphicFrame>
+    </p:spTree>
+    <p:extLst>
+      <p:ext uri="{BB962C8B-B14F-4D97-AF65-F5344CB8AC3E}">
+        <p14:creationId xmlns:p14="http://schemas.microsoft.com/office/powerpoint/2010/main" val="3226864652"/>
+      </p:ext>
+    </p:extLst>
+  </p:cSld>
+  <p:clrMapOvr>
+    <a:masterClrMapping/>
+  </p:clrMapOvr>
+</p:sld>
+</file>
+
+<file path=ppt/slides/slide11.xml><?xml version="1.0" encoding="utf-8"?>
+<p:sld xmlns:a="http://schemas.openxmlformats.org/drawingml/2006/main" xmlns:r="http://schemas.openxmlformats.org/officeDocument/2006/relationships" xmlns:p="http://schemas.openxmlformats.org/presentationml/2006/main">
+  <p:cSld>
+    <p:spTree>
+      <p:nvGrpSpPr>
+        <p:cNvPr id="1" name=""/>
+        <p:cNvGrpSpPr/>
+        <p:nvPr/>
+      </p:nvGrpSpPr>
+      <p:grpSpPr>
+        <a:xfrm>
+          <a:off x="0" y="0"/>
+          <a:ext cx="0" cy="0"/>
+          <a:chOff x="0" y="0"/>
+          <a:chExt cx="0" cy="0"/>
+        </a:xfrm>
+      </p:grpSpPr>
+      <p:sp>
+        <p:nvSpPr>
+          <p:cNvPr id="4" name="TextBox 3">
+            <a:extLst>
+              <a:ext uri="{FF2B5EF4-FFF2-40B4-BE49-F238E27FC236}">
+                <a16:creationId xmlns:a16="http://schemas.microsoft.com/office/drawing/2014/main" id="{C07C45B8-4983-4FFB-BD8B-B2F43686E476}"/>
+              </a:ext>
+            </a:extLst>
+          </p:cNvPr>
+          <p:cNvSpPr txBox="1"/>
+          <p:nvPr/>
+        </p:nvSpPr>
+        <p:spPr>
+          <a:xfrm flipH="1">
+            <a:off x="348339" y="457163"/>
             <a:ext cx="11760533" cy="954107"/>
           </a:xfrm>
           <a:prstGeom prst="rect">
@@ -4825,7 +5618,7 @@
                   <a:latin typeface="Segoe UI" panose="020B0502040204020203" pitchFamily="34" charset="0"/>
                   <a:cs typeface="Segoe UI" panose="020B0502040204020203" pitchFamily="34" charset="0"/>
                 </a:rPr>
-                <a:t>Education Accelerator Common Common</a:t>
+                <a:t>Education Accelerator Common</a:t>
               </a:r>
             </a:p>
           </p:txBody>
@@ -4880,7 +5673,7 @@
                   <a:latin typeface="Segoe UI" panose="020B0502040204020203" pitchFamily="34" charset="0"/>
                   <a:cs typeface="Segoe UI" panose="020B0502040204020203" pitchFamily="34" charset="0"/>
                 </a:rPr>
-                <a:t>Dynamics 365 Higher Education Accelerator Common Canvas Model Apps</a:t>
+                <a:t>Dynamics 365 Higher Education Accelerator Canvas Model Apps</a:t>
               </a:r>
             </a:p>
           </p:txBody>
@@ -4938,7 +5731,7 @@
                   <a:latin typeface="Segoe UI" panose="020B0502040204020203" pitchFamily="34" charset="0"/>
                   <a:cs typeface="Segoe UI" panose="020B0502040204020203" pitchFamily="34" charset="0"/>
                 </a:rPr>
-                <a:t>Dynamics 365 Higher Education Accelerator Common</a:t>
+                <a:t>Dynamics 365 Higher Education Accelerator</a:t>
               </a:r>
             </a:p>
           </p:txBody>
@@ -5151,7 +5944,7 @@
 </p:sld>
 </file>
 
-<file path=ppt/slides/slide11.xml><?xml version="1.0" encoding="utf-8"?>
+<file path=ppt/slides/slide12.xml><?xml version="1.0" encoding="utf-8"?>
 <p:sld xmlns:a="http://schemas.openxmlformats.org/drawingml/2006/main" xmlns:r="http://schemas.openxmlformats.org/officeDocument/2006/relationships" xmlns:p="http://schemas.openxmlformats.org/presentationml/2006/main">
   <p:cSld>
     <p:spTree>
@@ -5272,14 +6065,14 @@
           <p:nvPr>
             <p:extLst>
               <p:ext uri="{D42A27DB-BD31-4B8C-83A1-F6EECF244321}">
-                <p14:modId xmlns:p14="http://schemas.microsoft.com/office/powerpoint/2010/main" val="4107696024"/>
+                <p14:modId xmlns:p14="http://schemas.microsoft.com/office/powerpoint/2010/main" val="642713260"/>
               </p:ext>
             </p:extLst>
           </p:nvPr>
         </p:nvGraphicFramePr>
         <p:xfrm>
           <a:off x="7131688" y="1124324"/>
-          <a:ext cx="4799054" cy="4744720"/>
+          <a:ext cx="4799054" cy="5115560"/>
         </p:xfrm>
         <a:graphic>
           <a:graphicData uri="http://schemas.openxmlformats.org/drawingml/2006/table">
@@ -5288,14 +6081,14 @@
                 <a:tableStyleId>{B301B821-A1FF-4177-AEE7-76D212191A09}</a:tableStyleId>
               </a:tblPr>
               <a:tblGrid>
-                <a:gridCol w="2186483">
+                <a:gridCol w="2034346">
                   <a:extLst>
                     <a:ext uri="{9D8B030D-6E8A-4147-A177-3AD203B41FA5}">
                       <a16:colId xmlns:a16="http://schemas.microsoft.com/office/drawing/2014/main" val="832068167"/>
                     </a:ext>
                   </a:extLst>
                 </a:gridCol>
-                <a:gridCol w="2612571">
+                <a:gridCol w="2764708">
                   <a:extLst>
                     <a:ext uri="{9D8B030D-6E8A-4147-A177-3AD203B41FA5}">
                       <a16:colId xmlns:a16="http://schemas.microsoft.com/office/drawing/2014/main" val="2702330717"/>
@@ -5410,73 +6203,7 @@
                     <a:p>
                       <a:r>
                         <a:rPr lang="en-US" sz="1400" dirty="0"/>
-                        <a:t>Contact</a:t>
-                      </a:r>
-                    </a:p>
-                  </a:txBody>
-                  <a:tcPr/>
-                </a:tc>
-                <a:tc>
-                  <a:txBody>
-                    <a:bodyPr/>
-                    <a:lstStyle/>
-                    <a:p>
-                      <a:r>
-                        <a:rPr lang="en-US" sz="1400" dirty="0"/>
-                        <a:t>Common CDM</a:t>
-                      </a:r>
-                    </a:p>
-                  </a:txBody>
-                  <a:tcPr/>
-                </a:tc>
-                <a:extLst>
-                  <a:ext uri="{0D108BD9-81ED-4DB2-BD59-A6C34878D82A}">
-                    <a16:rowId xmlns:a16="http://schemas.microsoft.com/office/drawing/2014/main" val="1814603751"/>
-                  </a:ext>
-                </a:extLst>
-              </a:tr>
-              <a:tr h="370840">
-                <a:tc>
-                  <a:txBody>
-                    <a:bodyPr/>
-                    <a:lstStyle/>
-                    <a:p>
-                      <a:r>
-                        <a:rPr lang="en-US" sz="1400" dirty="0"/>
-                        <a:t>Course</a:t>
-                      </a:r>
-                    </a:p>
-                  </a:txBody>
-                  <a:tcPr/>
-                </a:tc>
-                <a:tc>
-                  <a:txBody>
-                    <a:bodyPr/>
-                    <a:lstStyle/>
-                    <a:p>
-                      <a:r>
-                        <a:rPr lang="en-US" sz="1400" dirty="0"/>
-                        <a:t>Education Accelerator Common</a:t>
-                      </a:r>
-                    </a:p>
-                  </a:txBody>
-                  <a:tcPr/>
-                </a:tc>
-                <a:extLst>
-                  <a:ext uri="{0D108BD9-81ED-4DB2-BD59-A6C34878D82A}">
-                    <a16:rowId xmlns:a16="http://schemas.microsoft.com/office/drawing/2014/main" val="2241325783"/>
-                  </a:ext>
-                </a:extLst>
-              </a:tr>
-              <a:tr h="370840">
-                <a:tc>
-                  <a:txBody>
-                    <a:bodyPr/>
-                    <a:lstStyle/>
-                    <a:p>
-                      <a:r>
-                        <a:rPr lang="en-US" sz="1400" dirty="0"/>
-                        <a:t>Course History</a:t>
+                        <a:t>Achievement</a:t>
                       </a:r>
                     </a:p>
                   </a:txBody>
@@ -5514,6 +6241,122 @@
                 </a:tc>
                 <a:extLst>
                   <a:ext uri="{0D108BD9-81ED-4DB2-BD59-A6C34878D82A}">
+                    <a16:rowId xmlns:a16="http://schemas.microsoft.com/office/drawing/2014/main" val="3655169339"/>
+                  </a:ext>
+                </a:extLst>
+              </a:tr>
+              <a:tr h="370840">
+                <a:tc>
+                  <a:txBody>
+                    <a:bodyPr/>
+                    <a:lstStyle/>
+                    <a:p>
+                      <a:r>
+                        <a:rPr lang="en-US" sz="1400" dirty="0"/>
+                        <a:t>Contact</a:t>
+                      </a:r>
+                    </a:p>
+                  </a:txBody>
+                  <a:tcPr/>
+                </a:tc>
+                <a:tc>
+                  <a:txBody>
+                    <a:bodyPr/>
+                    <a:lstStyle/>
+                    <a:p>
+                      <a:r>
+                        <a:rPr lang="en-US" sz="1400" dirty="0"/>
+                        <a:t>Common CDM</a:t>
+                      </a:r>
+                    </a:p>
+                  </a:txBody>
+                  <a:tcPr/>
+                </a:tc>
+                <a:extLst>
+                  <a:ext uri="{0D108BD9-81ED-4DB2-BD59-A6C34878D82A}">
+                    <a16:rowId xmlns:a16="http://schemas.microsoft.com/office/drawing/2014/main" val="1814603751"/>
+                  </a:ext>
+                </a:extLst>
+              </a:tr>
+              <a:tr h="370840">
+                <a:tc>
+                  <a:txBody>
+                    <a:bodyPr/>
+                    <a:lstStyle/>
+                    <a:p>
+                      <a:r>
+                        <a:rPr lang="en-US" sz="1400" dirty="0"/>
+                        <a:t>Course</a:t>
+                      </a:r>
+                    </a:p>
+                  </a:txBody>
+                  <a:tcPr/>
+                </a:tc>
+                <a:tc>
+                  <a:txBody>
+                    <a:bodyPr/>
+                    <a:lstStyle/>
+                    <a:p>
+                      <a:r>
+                        <a:rPr lang="en-US" sz="1400" dirty="0"/>
+                        <a:t>Education Accelerator Common</a:t>
+                      </a:r>
+                    </a:p>
+                  </a:txBody>
+                  <a:tcPr/>
+                </a:tc>
+                <a:extLst>
+                  <a:ext uri="{0D108BD9-81ED-4DB2-BD59-A6C34878D82A}">
+                    <a16:rowId xmlns:a16="http://schemas.microsoft.com/office/drawing/2014/main" val="2241325783"/>
+                  </a:ext>
+                </a:extLst>
+              </a:tr>
+              <a:tr h="370840">
+                <a:tc>
+                  <a:txBody>
+                    <a:bodyPr/>
+                    <a:lstStyle/>
+                    <a:p>
+                      <a:r>
+                        <a:rPr lang="en-US" sz="1400" dirty="0"/>
+                        <a:t>Course History</a:t>
+                      </a:r>
+                    </a:p>
+                  </a:txBody>
+                  <a:tcPr/>
+                </a:tc>
+                <a:tc>
+                  <a:txBody>
+                    <a:bodyPr/>
+                    <a:lstStyle/>
+                    <a:p>
+                      <a:pPr marL="0" marR="0" lvl="0" indent="0" algn="l" defTabSz="914400" rtl="0" eaLnBrk="1" fontAlgn="auto" latinLnBrk="0" hangingPunct="1">
+                        <a:lnSpc>
+                          <a:spcPct val="100000"/>
+                        </a:lnSpc>
+                        <a:spcBef>
+                          <a:spcPts val="0"/>
+                        </a:spcBef>
+                        <a:spcAft>
+                          <a:spcPts val="0"/>
+                        </a:spcAft>
+                        <a:buClrTx/>
+                        <a:buSzTx/>
+                        <a:buFontTx/>
+                        <a:buNone/>
+                        <a:tabLst/>
+                        <a:defRPr/>
+                      </a:pPr>
+                      <a:r>
+                        <a:rPr lang="en-US" sz="1400" dirty="0"/>
+                        <a:t>Education Accelerator Common</a:t>
+                      </a:r>
+                    </a:p>
+                  </a:txBody>
+                  <a:tcPr/>
+                </a:tc>
+                <a:extLst>
+                  <a:ext uri="{0D108BD9-81ED-4DB2-BD59-A6C34878D82A}">
                     <a16:rowId xmlns:a16="http://schemas.microsoft.com/office/drawing/2014/main" val="2508927978"/>
                   </a:ext>
                 </a:extLst>
@@ -5526,7 +6369,7 @@
                     <a:p>
                       <a:r>
                         <a:rPr lang="en-US" sz="1400" dirty="0"/>
-                        <a:t>Entity Permission</a:t>
+                        <a:t>Table Permission</a:t>
                       </a:r>
                     </a:p>
                   </a:txBody>
@@ -5919,7 +6762,7 @@
                   <a:latin typeface="Segoe UI" panose="020B0502040204020203" pitchFamily="34" charset="0"/>
                   <a:cs typeface="Segoe UI" panose="020B0502040204020203" pitchFamily="34" charset="0"/>
                 </a:rPr>
-                <a:t>Education Accelerator Common Common</a:t>
+                <a:t>Education Accelerator Common</a:t>
               </a:r>
             </a:p>
           </p:txBody>
@@ -5977,7 +6820,7 @@
                   <a:latin typeface="Segoe UI" panose="020B0502040204020203" pitchFamily="34" charset="0"/>
                   <a:cs typeface="Segoe UI" panose="020B0502040204020203" pitchFamily="34" charset="0"/>
                 </a:rPr>
-                <a:t>Dynamics 365 Higher Education Accelerator Common Canvas Model Apps</a:t>
+                <a:t>Dynamics 365 Higher Education Accelerator Canvas Model Apps</a:t>
               </a:r>
             </a:p>
           </p:txBody>
@@ -6035,7 +6878,7 @@
                   <a:latin typeface="Segoe UI" panose="020B0502040204020203" pitchFamily="34" charset="0"/>
                   <a:cs typeface="Segoe UI" panose="020B0502040204020203" pitchFamily="34" charset="0"/>
                 </a:rPr>
-                <a:t>Dynamics 365 Higher Education Accelerator Common</a:t>
+                <a:t>Dynamics 365 Higher Education Accelerator</a:t>
               </a:r>
             </a:p>
           </p:txBody>
@@ -6235,7 +7078,7 @@
     </p:spTree>
     <p:extLst>
       <p:ext uri="{BB962C8B-B14F-4D97-AF65-F5344CB8AC3E}">
-        <p14:creationId xmlns:p14="http://schemas.microsoft.com/office/powerpoint/2010/main" val="1165888932"/>
+        <p14:creationId xmlns:p14="http://schemas.microsoft.com/office/powerpoint/2010/main" val="3539502807"/>
       </p:ext>
     </p:extLst>
   </p:cSld>
@@ -6245,7 +7088,7 @@
 </p:sld>
 </file>
 
-<file path=ppt/slides/slide12.xml><?xml version="1.0" encoding="utf-8"?>
+<file path=ppt/slides/slide13.xml><?xml version="1.0" encoding="utf-8"?>
 <p:sld xmlns:a="http://schemas.openxmlformats.org/drawingml/2006/main" xmlns:r="http://schemas.openxmlformats.org/officeDocument/2006/relationships" xmlns:p="http://schemas.openxmlformats.org/presentationml/2006/main">
   <p:cSld>
     <p:spTree>
@@ -6363,13 +7206,7 @@
           <p:cNvGraphicFramePr>
             <a:graphicFrameLocks noGrp="1"/>
           </p:cNvGraphicFramePr>
-          <p:nvPr>
-            <p:extLst>
-              <p:ext uri="{D42A27DB-BD31-4B8C-83A1-F6EECF244321}">
-                <p14:modId xmlns:p14="http://schemas.microsoft.com/office/powerpoint/2010/main" val="3369793426"/>
-              </p:ext>
-            </p:extLst>
-          </p:nvPr>
+          <p:nvPr/>
         </p:nvGraphicFramePr>
         <p:xfrm>
           <a:off x="7131687" y="1555797"/>
@@ -6798,7 +7635,7 @@
                   <a:latin typeface="Segoe UI" panose="020B0502040204020203" pitchFamily="34" charset="0"/>
                   <a:cs typeface="Segoe UI" panose="020B0502040204020203" pitchFamily="34" charset="0"/>
                 </a:rPr>
-                <a:t>Education Accelerator Common Common</a:t>
+                <a:t>Education Accelerator Common</a:t>
               </a:r>
             </a:p>
           </p:txBody>
@@ -6856,7 +7693,7 @@
                   <a:latin typeface="Segoe UI" panose="020B0502040204020203" pitchFamily="34" charset="0"/>
                   <a:cs typeface="Segoe UI" panose="020B0502040204020203" pitchFamily="34" charset="0"/>
                 </a:rPr>
-                <a:t>Dynamics 365 Higher Education Accelerator Common Canvas Model Apps</a:t>
+                <a:t>Dynamics 365 Higher Education Accelerator Canvas Model Apps</a:t>
               </a:r>
             </a:p>
           </p:txBody>
@@ -6914,7 +7751,7 @@
                   <a:latin typeface="Segoe UI" panose="020B0502040204020203" pitchFamily="34" charset="0"/>
                   <a:cs typeface="Segoe UI" panose="020B0502040204020203" pitchFamily="34" charset="0"/>
                 </a:rPr>
-                <a:t>Dynamics 365 Higher Education Accelerator Common</a:t>
+                <a:t>Dynamics 365 Higher Education Accelerator</a:t>
               </a:r>
             </a:p>
           </p:txBody>
@@ -7114,7 +7951,7 @@
     </p:spTree>
     <p:extLst>
       <p:ext uri="{BB962C8B-B14F-4D97-AF65-F5344CB8AC3E}">
-        <p14:creationId xmlns:p14="http://schemas.microsoft.com/office/powerpoint/2010/main" val="2377790575"/>
+        <p14:creationId xmlns:p14="http://schemas.microsoft.com/office/powerpoint/2010/main" val="1636523032"/>
       </p:ext>
     </p:extLst>
   </p:cSld>
@@ -7124,7 +7961,7 @@
 </p:sld>
 </file>
 
-<file path=ppt/slides/slide13.xml><?xml version="1.0" encoding="utf-8"?>
+<file path=ppt/slides/slide14.xml><?xml version="1.0" encoding="utf-8"?>
 <p:sld xmlns:a="http://schemas.openxmlformats.org/drawingml/2006/main" xmlns:r="http://schemas.openxmlformats.org/officeDocument/2006/relationships" xmlns:p="http://schemas.openxmlformats.org/presentationml/2006/main">
   <p:cSld>
     <p:spTree>
@@ -7208,10 +8045,10 @@
       </p:sp>
       <p:pic>
         <p:nvPicPr>
-          <p:cNvPr id="3" name="Picture 2">
+          <p:cNvPr id="5" name="Picture 4">
             <a:extLst>
               <a:ext uri="{FF2B5EF4-FFF2-40B4-BE49-F238E27FC236}">
-                <a16:creationId xmlns:a16="http://schemas.microsoft.com/office/drawing/2014/main" id="{DEFB1691-37A7-4BA7-A5AF-F0A5044FFD04}"/>
+                <a16:creationId xmlns:a16="http://schemas.microsoft.com/office/drawing/2014/main" id="{96C932DD-6290-425F-9E27-D9836401BCD8}"/>
               </a:ext>
             </a:extLst>
           </p:cNvPr>
@@ -7228,8 +8065,8 @@
         </p:blipFill>
         <p:spPr>
           <a:xfrm>
-            <a:off x="1462427" y="980383"/>
-            <a:ext cx="8669863" cy="5719635"/>
+            <a:off x="1245454" y="1139706"/>
+            <a:ext cx="8328204" cy="5524043"/>
           </a:xfrm>
           <a:prstGeom prst="rect">
             <a:avLst/>
@@ -7249,7 +8086,7 @@
 </p:sld>
 </file>
 
-<file path=ppt/slides/slide14.xml><?xml version="1.0" encoding="utf-8"?>
+<file path=ppt/slides/slide15.xml><?xml version="1.0" encoding="utf-8"?>
 <p:sld xmlns:a="http://schemas.openxmlformats.org/drawingml/2006/main" xmlns:r="http://schemas.openxmlformats.org/officeDocument/2006/relationships" xmlns:p="http://schemas.openxmlformats.org/presentationml/2006/main">
   <p:cSld>
     <p:spTree>
@@ -9606,17 +10443,11 @@
           <p:cNvGraphicFramePr>
             <a:graphicFrameLocks noGrp="1"/>
           </p:cNvGraphicFramePr>
-          <p:nvPr>
-            <p:extLst>
-              <p:ext uri="{D42A27DB-BD31-4B8C-83A1-F6EECF244321}">
-                <p14:modId xmlns:p14="http://schemas.microsoft.com/office/powerpoint/2010/main" val="1298374592"/>
-              </p:ext>
-            </p:extLst>
-          </p:nvPr>
+          <p:nvPr/>
         </p:nvGraphicFramePr>
         <p:xfrm>
           <a:off x="7150654" y="1066267"/>
-          <a:ext cx="3757491" cy="5562600"/>
+          <a:ext cx="3757491" cy="4820920"/>
         </p:xfrm>
         <a:graphic>
           <a:graphicData uri="http://schemas.openxmlformats.org/drawingml/2006/table">
@@ -9660,8 +10491,239 @@
                     <a:lstStyle/>
                     <a:p>
                       <a:r>
+                        <a:rPr lang="en-US" sz="1400"/>
+                        <a:t>Academic Period</a:t>
+                      </a:r>
+                      <a:endParaRPr lang="en-US" sz="1400" dirty="0"/>
+                    </a:p>
+                  </a:txBody>
+                  <a:tcPr/>
+                </a:tc>
+                <a:extLst>
+                  <a:ext uri="{0D108BD9-81ED-4DB2-BD59-A6C34878D82A}">
+                    <a16:rowId xmlns:a16="http://schemas.microsoft.com/office/drawing/2014/main" val="675831119"/>
+                  </a:ext>
+                </a:extLst>
+              </a:tr>
+              <a:tr h="370840">
+                <a:tc>
+                  <a:txBody>
+                    <a:bodyPr/>
+                    <a:lstStyle/>
+                    <a:p>
+                      <a:r>
+                        <a:rPr lang="en-US" sz="1400"/>
+                        <a:t>Academic Period Detail</a:t>
+                      </a:r>
+                      <a:endParaRPr lang="en-US" sz="1400" dirty="0"/>
+                    </a:p>
+                  </a:txBody>
+                  <a:tcPr/>
+                </a:tc>
+                <a:extLst>
+                  <a:ext uri="{0D108BD9-81ED-4DB2-BD59-A6C34878D82A}">
+                    <a16:rowId xmlns:a16="http://schemas.microsoft.com/office/drawing/2014/main" val="2136345013"/>
+                  </a:ext>
+                </a:extLst>
+              </a:tr>
+              <a:tr h="370840">
+                <a:tc>
+                  <a:txBody>
+                    <a:bodyPr/>
+                    <a:lstStyle/>
+                    <a:p>
+                      <a:r>
+                        <a:rPr lang="en-US" sz="1400"/>
+                        <a:t>Academic Subject</a:t>
+                      </a:r>
+                      <a:endParaRPr lang="en-US" sz="1400" dirty="0"/>
+                    </a:p>
+                  </a:txBody>
+                  <a:tcPr/>
+                </a:tc>
+                <a:extLst>
+                  <a:ext uri="{0D108BD9-81ED-4DB2-BD59-A6C34878D82A}">
+                    <a16:rowId xmlns:a16="http://schemas.microsoft.com/office/drawing/2014/main" val="2369919786"/>
+                  </a:ext>
+                </a:extLst>
+              </a:tr>
+              <a:tr h="370840">
+                <a:tc>
+                  <a:txBody>
+                    <a:bodyPr/>
+                    <a:lstStyle/>
+                    <a:p>
+                      <a:r>
+                        <a:rPr lang="en-US" sz="1400"/>
+                        <a:t>Achievements</a:t>
+                      </a:r>
+                      <a:endParaRPr lang="en-US" sz="1400" dirty="0"/>
+                    </a:p>
+                  </a:txBody>
+                  <a:tcPr/>
+                </a:tc>
+                <a:extLst>
+                  <a:ext uri="{0D108BD9-81ED-4DB2-BD59-A6C34878D82A}">
+                    <a16:rowId xmlns:a16="http://schemas.microsoft.com/office/drawing/2014/main" val="1457320045"/>
+                  </a:ext>
+                </a:extLst>
+              </a:tr>
+              <a:tr h="370840">
+                <a:tc>
+                  <a:txBody>
+                    <a:bodyPr/>
+                    <a:lstStyle/>
+                    <a:p>
+                      <a:r>
+                        <a:rPr lang="en-US" sz="1400"/>
+                        <a:t>Accomplishment</a:t>
+                      </a:r>
+                      <a:endParaRPr lang="en-US" sz="1400" dirty="0"/>
+                    </a:p>
+                  </a:txBody>
+                  <a:tcPr/>
+                </a:tc>
+                <a:extLst>
+                  <a:ext uri="{0D108BD9-81ED-4DB2-BD59-A6C34878D82A}">
+                    <a16:rowId xmlns:a16="http://schemas.microsoft.com/office/drawing/2014/main" val="1814603751"/>
+                  </a:ext>
+                </a:extLst>
+              </a:tr>
+              <a:tr h="370840">
+                <a:tc>
+                  <a:txBody>
+                    <a:bodyPr/>
+                    <a:lstStyle/>
+                    <a:p>
+                      <a:r>
+                        <a:rPr lang="en-US" sz="1400"/>
+                        <a:t>Area of Interest</a:t>
+                      </a:r>
+                      <a:endParaRPr lang="en-US" sz="1400" dirty="0"/>
+                    </a:p>
+                  </a:txBody>
+                  <a:tcPr/>
+                </a:tc>
+                <a:extLst>
+                  <a:ext uri="{0D108BD9-81ED-4DB2-BD59-A6C34878D82A}">
+                    <a16:rowId xmlns:a16="http://schemas.microsoft.com/office/drawing/2014/main" val="2241325783"/>
+                  </a:ext>
+                </a:extLst>
+              </a:tr>
+              <a:tr h="370840">
+                <a:tc>
+                  <a:txBody>
+                    <a:bodyPr/>
+                    <a:lstStyle/>
+                    <a:p>
+                      <a:r>
+                        <a:rPr lang="en-US" sz="1400"/>
+                        <a:t>Area of Study</a:t>
+                      </a:r>
+                      <a:endParaRPr lang="en-US" sz="1400" dirty="0"/>
+                    </a:p>
+                  </a:txBody>
+                  <a:tcPr/>
+                </a:tc>
+                <a:extLst>
+                  <a:ext uri="{0D108BD9-81ED-4DB2-BD59-A6C34878D82A}">
+                    <a16:rowId xmlns:a16="http://schemas.microsoft.com/office/drawing/2014/main" val="2508927978"/>
+                  </a:ext>
+                </a:extLst>
+              </a:tr>
+              <a:tr h="370840">
+                <a:tc>
+                  <a:txBody>
+                    <a:bodyPr/>
+                    <a:lstStyle/>
+                    <a:p>
+                      <a:r>
+                        <a:rPr lang="en-US" sz="1400"/>
+                        <a:t>Bell Schedule</a:t>
+                      </a:r>
+                      <a:endParaRPr lang="en-US" sz="1400" dirty="0"/>
+                    </a:p>
+                  </a:txBody>
+                  <a:tcPr/>
+                </a:tc>
+                <a:extLst>
+                  <a:ext uri="{0D108BD9-81ED-4DB2-BD59-A6C34878D82A}">
+                    <a16:rowId xmlns:a16="http://schemas.microsoft.com/office/drawing/2014/main" val="4157627035"/>
+                  </a:ext>
+                </a:extLst>
+              </a:tr>
+              <a:tr h="370840">
+                <a:tc>
+                  <a:txBody>
+                    <a:bodyPr/>
+                    <a:lstStyle/>
+                    <a:p>
+                      <a:r>
+                        <a:rPr lang="en-US" sz="1400"/>
+                        <a:t>Bell Schedule Time</a:t>
+                      </a:r>
+                      <a:endParaRPr lang="en-US" sz="1400" dirty="0"/>
+                    </a:p>
+                  </a:txBody>
+                  <a:tcPr/>
+                </a:tc>
+                <a:extLst>
+                  <a:ext uri="{0D108BD9-81ED-4DB2-BD59-A6C34878D82A}">
+                    <a16:rowId xmlns:a16="http://schemas.microsoft.com/office/drawing/2014/main" val="3805098615"/>
+                  </a:ext>
+                </a:extLst>
+              </a:tr>
+              <a:tr h="370840">
+                <a:tc>
+                  <a:txBody>
+                    <a:bodyPr/>
+                    <a:lstStyle/>
+                    <a:p>
+                      <a:r>
+                        <a:rPr lang="en-US" sz="1400"/>
+                        <a:t>Certification</a:t>
+                      </a:r>
+                      <a:endParaRPr lang="en-US" sz="1400" dirty="0"/>
+                    </a:p>
+                  </a:txBody>
+                  <a:tcPr/>
+                </a:tc>
+                <a:extLst>
+                  <a:ext uri="{0D108BD9-81ED-4DB2-BD59-A6C34878D82A}">
+                    <a16:rowId xmlns:a16="http://schemas.microsoft.com/office/drawing/2014/main" val="2599236061"/>
+                  </a:ext>
+                </a:extLst>
+              </a:tr>
+              <a:tr h="370840">
+                <a:tc>
+                  <a:txBody>
+                    <a:bodyPr/>
+                    <a:lstStyle/>
+                    <a:p>
+                      <a:r>
+                        <a:rPr lang="en-US" sz="1400"/>
+                        <a:t>Certification Process</a:t>
+                      </a:r>
+                      <a:endParaRPr lang="en-US" sz="1400" dirty="0"/>
+                    </a:p>
+                  </a:txBody>
+                  <a:tcPr/>
+                </a:tc>
+                <a:extLst>
+                  <a:ext uri="{0D108BD9-81ED-4DB2-BD59-A6C34878D82A}">
+                    <a16:rowId xmlns:a16="http://schemas.microsoft.com/office/drawing/2014/main" val="1910057475"/>
+                  </a:ext>
+                </a:extLst>
+              </a:tr>
+              <a:tr h="370840">
+                <a:tc>
+                  <a:txBody>
+                    <a:bodyPr/>
+                    <a:lstStyle/>
+                    <a:p>
+                      <a:r>
                         <a:rPr lang="en-US" sz="1400" dirty="0"/>
-                        <a:t>Academic Period</a:t>
+                        <a:t>Certification Requirement</a:t>
                       </a:r>
                     </a:p>
                   </a:txBody>
@@ -9669,267 +10731,7 @@
                 </a:tc>
                 <a:extLst>
                   <a:ext uri="{0D108BD9-81ED-4DB2-BD59-A6C34878D82A}">
-                    <a16:rowId xmlns:a16="http://schemas.microsoft.com/office/drawing/2014/main" val="675831119"/>
-                  </a:ext>
-                </a:extLst>
-              </a:tr>
-              <a:tr h="370840">
-                <a:tc>
-                  <a:txBody>
-                    <a:bodyPr/>
-                    <a:lstStyle/>
-                    <a:p>
-                      <a:r>
-                        <a:rPr lang="en-US" sz="1400" dirty="0"/>
-                        <a:t>Academic Period Detail</a:t>
-                      </a:r>
-                    </a:p>
-                  </a:txBody>
-                  <a:tcPr/>
-                </a:tc>
-                <a:extLst>
-                  <a:ext uri="{0D108BD9-81ED-4DB2-BD59-A6C34878D82A}">
-                    <a16:rowId xmlns:a16="http://schemas.microsoft.com/office/drawing/2014/main" val="2136345013"/>
-                  </a:ext>
-                </a:extLst>
-              </a:tr>
-              <a:tr h="370840">
-                <a:tc>
-                  <a:txBody>
-                    <a:bodyPr/>
-                    <a:lstStyle/>
-                    <a:p>
-                      <a:r>
-                        <a:rPr lang="en-US" sz="1400" dirty="0"/>
-                        <a:t>Accomplishment</a:t>
-                      </a:r>
-                    </a:p>
-                  </a:txBody>
-                  <a:tcPr/>
-                </a:tc>
-                <a:extLst>
-                  <a:ext uri="{0D108BD9-81ED-4DB2-BD59-A6C34878D82A}">
-                    <a16:rowId xmlns:a16="http://schemas.microsoft.com/office/drawing/2014/main" val="1814603751"/>
-                  </a:ext>
-                </a:extLst>
-              </a:tr>
-              <a:tr h="370840">
-                <a:tc>
-                  <a:txBody>
-                    <a:bodyPr/>
-                    <a:lstStyle/>
-                    <a:p>
-                      <a:r>
-                        <a:rPr lang="en-US" sz="1400" dirty="0"/>
-                        <a:t>Area of Interest</a:t>
-                      </a:r>
-                    </a:p>
-                  </a:txBody>
-                  <a:tcPr/>
-                </a:tc>
-                <a:extLst>
-                  <a:ext uri="{0D108BD9-81ED-4DB2-BD59-A6C34878D82A}">
-                    <a16:rowId xmlns:a16="http://schemas.microsoft.com/office/drawing/2014/main" val="2241325783"/>
-                  </a:ext>
-                </a:extLst>
-              </a:tr>
-              <a:tr h="370840">
-                <a:tc>
-                  <a:txBody>
-                    <a:bodyPr/>
-                    <a:lstStyle/>
-                    <a:p>
-                      <a:r>
-                        <a:rPr lang="en-US" sz="1400" dirty="0"/>
-                        <a:t>Area of Study</a:t>
-                      </a:r>
-                    </a:p>
-                  </a:txBody>
-                  <a:tcPr/>
-                </a:tc>
-                <a:extLst>
-                  <a:ext uri="{0D108BD9-81ED-4DB2-BD59-A6C34878D82A}">
-                    <a16:rowId xmlns:a16="http://schemas.microsoft.com/office/drawing/2014/main" val="2508927978"/>
-                  </a:ext>
-                </a:extLst>
-              </a:tr>
-              <a:tr h="370840">
-                <a:tc>
-                  <a:txBody>
-                    <a:bodyPr/>
-                    <a:lstStyle/>
-                    <a:p>
-                      <a:r>
-                        <a:rPr lang="en-US" sz="1400" dirty="0"/>
-                        <a:t>Course</a:t>
-                      </a:r>
-                    </a:p>
-                  </a:txBody>
-                  <a:tcPr/>
-                </a:tc>
-                <a:extLst>
-                  <a:ext uri="{0D108BD9-81ED-4DB2-BD59-A6C34878D82A}">
-                    <a16:rowId xmlns:a16="http://schemas.microsoft.com/office/drawing/2014/main" val="3838149768"/>
-                  </a:ext>
-                </a:extLst>
-              </a:tr>
-              <a:tr h="370840">
-                <a:tc>
-                  <a:txBody>
-                    <a:bodyPr/>
-                    <a:lstStyle/>
-                    <a:p>
-                      <a:r>
-                        <a:rPr lang="en-US" sz="1400" dirty="0"/>
-                        <a:t>Course History</a:t>
-                      </a:r>
-                    </a:p>
-                  </a:txBody>
-                  <a:tcPr/>
-                </a:tc>
-                <a:extLst>
-                  <a:ext uri="{0D108BD9-81ED-4DB2-BD59-A6C34878D82A}">
-                    <a16:rowId xmlns:a16="http://schemas.microsoft.com/office/drawing/2014/main" val="2224312903"/>
-                  </a:ext>
-                </a:extLst>
-              </a:tr>
-              <a:tr h="370840">
-                <a:tc>
-                  <a:txBody>
-                    <a:bodyPr/>
-                    <a:lstStyle/>
-                    <a:p>
-                      <a:r>
-                        <a:rPr lang="en-US" sz="1400" dirty="0"/>
-                        <a:t>Course Section</a:t>
-                      </a:r>
-                    </a:p>
-                  </a:txBody>
-                  <a:tcPr/>
-                </a:tc>
-                <a:extLst>
-                  <a:ext uri="{0D108BD9-81ED-4DB2-BD59-A6C34878D82A}">
-                    <a16:rowId xmlns:a16="http://schemas.microsoft.com/office/drawing/2014/main" val="667350202"/>
-                  </a:ext>
-                </a:extLst>
-              </a:tr>
-              <a:tr h="370840">
-                <a:tc>
-                  <a:txBody>
-                    <a:bodyPr/>
-                    <a:lstStyle/>
-                    <a:p>
-                      <a:r>
-                        <a:rPr lang="en-US" sz="1400" dirty="0"/>
-                        <a:t>Education Level</a:t>
-                      </a:r>
-                    </a:p>
-                  </a:txBody>
-                  <a:tcPr/>
-                </a:tc>
-                <a:extLst>
-                  <a:ext uri="{0D108BD9-81ED-4DB2-BD59-A6C34878D82A}">
-                    <a16:rowId xmlns:a16="http://schemas.microsoft.com/office/drawing/2014/main" val="1167480664"/>
-                  </a:ext>
-                </a:extLst>
-              </a:tr>
-              <a:tr h="370840">
-                <a:tc>
-                  <a:txBody>
-                    <a:bodyPr/>
-                    <a:lstStyle/>
-                    <a:p>
-                      <a:r>
-                        <a:rPr lang="en-US" sz="1400" dirty="0"/>
-                        <a:t>Extra Curricular Activity</a:t>
-                      </a:r>
-                    </a:p>
-                  </a:txBody>
-                  <a:tcPr/>
-                </a:tc>
-                <a:extLst>
-                  <a:ext uri="{0D108BD9-81ED-4DB2-BD59-A6C34878D82A}">
-                    <a16:rowId xmlns:a16="http://schemas.microsoft.com/office/drawing/2014/main" val="4086679046"/>
-                  </a:ext>
-                </a:extLst>
-              </a:tr>
-              <a:tr h="370840">
-                <a:tc>
-                  <a:txBody>
-                    <a:bodyPr/>
-                    <a:lstStyle/>
-                    <a:p>
-                      <a:r>
-                        <a:rPr lang="en-US" sz="1400" dirty="0"/>
-                        <a:t>Extra Curricular Participant</a:t>
-                      </a:r>
-                    </a:p>
-                  </a:txBody>
-                  <a:tcPr/>
-                </a:tc>
-                <a:extLst>
-                  <a:ext uri="{0D108BD9-81ED-4DB2-BD59-A6C34878D82A}">
-                    <a16:rowId xmlns:a16="http://schemas.microsoft.com/office/drawing/2014/main" val="2738240582"/>
-                  </a:ext>
-                </a:extLst>
-              </a:tr>
-              <a:tr h="370840">
-                <a:tc>
-                  <a:txBody>
-                    <a:bodyPr/>
-                    <a:lstStyle/>
-                    <a:p>
-                      <a:r>
-                        <a:rPr lang="en-US" sz="1400" dirty="0"/>
-                        <a:t>Internship</a:t>
-                      </a:r>
-                    </a:p>
-                  </a:txBody>
-                  <a:tcPr/>
-                </a:tc>
-                <a:extLst>
-                  <a:ext uri="{0D108BD9-81ED-4DB2-BD59-A6C34878D82A}">
-                    <a16:rowId xmlns:a16="http://schemas.microsoft.com/office/drawing/2014/main" val="160817269"/>
-                  </a:ext>
-                </a:extLst>
-              </a:tr>
-              <a:tr h="370840">
-                <a:tc>
-                  <a:txBody>
-                    <a:bodyPr/>
-                    <a:lstStyle/>
-                    <a:p>
-                      <a:r>
-                        <a:rPr lang="en-US" sz="1400" dirty="0"/>
-                        <a:t>Internship Applicant</a:t>
-                      </a:r>
-                    </a:p>
-                  </a:txBody>
-                  <a:tcPr/>
-                </a:tc>
-                <a:extLst>
-                  <a:ext uri="{0D108BD9-81ED-4DB2-BD59-A6C34878D82A}">
-                    <a16:rowId xmlns:a16="http://schemas.microsoft.com/office/drawing/2014/main" val="2253832558"/>
-                  </a:ext>
-                </a:extLst>
-              </a:tr>
-              <a:tr h="370840">
-                <a:tc>
-                  <a:txBody>
-                    <a:bodyPr/>
-                    <a:lstStyle/>
-                    <a:p>
-                      <a:r>
-                        <a:rPr lang="en-US" sz="1400" dirty="0"/>
-                        <a:t>Previous Education</a:t>
-                      </a:r>
-                    </a:p>
-                  </a:txBody>
-                  <a:tcPr/>
-                </a:tc>
-                <a:extLst>
-                  <a:ext uri="{0D108BD9-81ED-4DB2-BD59-A6C34878D82A}">
-                    <a16:rowId xmlns:a16="http://schemas.microsoft.com/office/drawing/2014/main" val="1604952704"/>
+                    <a16:rowId xmlns:a16="http://schemas.microsoft.com/office/drawing/2014/main" val="1354777288"/>
                   </a:ext>
                 </a:extLst>
               </a:tr>
@@ -10065,7 +10867,7 @@
                   <a:latin typeface="Segoe UI" panose="020B0502040204020203" pitchFamily="34" charset="0"/>
                   <a:cs typeface="Segoe UI" panose="020B0502040204020203" pitchFamily="34" charset="0"/>
                 </a:rPr>
-                <a:t>Education Accelerator Common Common</a:t>
+                <a:t>Education Accelerator Common</a:t>
               </a:r>
             </a:p>
           </p:txBody>
@@ -10123,7 +10925,7 @@
                   <a:latin typeface="Segoe UI" panose="020B0502040204020203" pitchFamily="34" charset="0"/>
                   <a:cs typeface="Segoe UI" panose="020B0502040204020203" pitchFamily="34" charset="0"/>
                 </a:rPr>
-                <a:t>Dynamics 365 Higher Education Accelerator Common Canvas Model Apps</a:t>
+                <a:t>Dynamics 365 Higher Education Accelerator Canvas Model Apps</a:t>
               </a:r>
             </a:p>
           </p:txBody>
@@ -10181,7 +10983,7 @@
                   <a:latin typeface="Segoe UI" panose="020B0502040204020203" pitchFamily="34" charset="0"/>
                   <a:cs typeface="Segoe UI" panose="020B0502040204020203" pitchFamily="34" charset="0"/>
                 </a:rPr>
-                <a:t>Dynamics 365 Higher Education Accelerator Common</a:t>
+                <a:t>Dynamics 365 Higher Education Accelerator</a:t>
               </a:r>
             </a:p>
           </p:txBody>
@@ -10384,7 +11186,7 @@
     </p:spTree>
     <p:extLst>
       <p:ext uri="{BB962C8B-B14F-4D97-AF65-F5344CB8AC3E}">
-        <p14:creationId xmlns:p14="http://schemas.microsoft.com/office/powerpoint/2010/main" val="391980474"/>
+        <p14:creationId xmlns:p14="http://schemas.microsoft.com/office/powerpoint/2010/main" val="1223523831"/>
       </p:ext>
     </p:extLst>
   </p:cSld>
@@ -10395,6 +11197,906 @@
 </file>
 
 <file path=ppt/slides/slide3.xml><?xml version="1.0" encoding="utf-8"?>
+<p:sld xmlns:a="http://schemas.openxmlformats.org/drawingml/2006/main" xmlns:r="http://schemas.openxmlformats.org/officeDocument/2006/relationships" xmlns:p="http://schemas.openxmlformats.org/presentationml/2006/main">
+  <p:cSld>
+    <p:spTree>
+      <p:nvGrpSpPr>
+        <p:cNvPr id="1" name=""/>
+        <p:cNvGrpSpPr/>
+        <p:nvPr/>
+      </p:nvGrpSpPr>
+      <p:grpSpPr>
+        <a:xfrm>
+          <a:off x="0" y="0"/>
+          <a:ext cx="0" cy="0"/>
+          <a:chOff x="0" y="0"/>
+          <a:chExt cx="0" cy="0"/>
+        </a:xfrm>
+      </p:grpSpPr>
+      <p:sp>
+        <p:nvSpPr>
+          <p:cNvPr id="4" name="TextBox 3">
+            <a:extLst>
+              <a:ext uri="{FF2B5EF4-FFF2-40B4-BE49-F238E27FC236}">
+                <a16:creationId xmlns:a16="http://schemas.microsoft.com/office/drawing/2014/main" id="{C07C45B8-4983-4FFB-BD8B-B2F43686E476}"/>
+              </a:ext>
+            </a:extLst>
+          </p:cNvPr>
+          <p:cNvSpPr txBox="1"/>
+          <p:nvPr/>
+        </p:nvSpPr>
+        <p:spPr>
+          <a:xfrm flipH="1">
+            <a:off x="348340" y="457163"/>
+            <a:ext cx="10559804" cy="523220"/>
+          </a:xfrm>
+          <a:prstGeom prst="rect">
+            <a:avLst/>
+          </a:prstGeom>
+          <a:noFill/>
+        </p:spPr>
+        <p:txBody>
+          <a:bodyPr wrap="square" rtlCol="0">
+            <a:spAutoFit/>
+          </a:bodyPr>
+          <a:lstStyle/>
+          <a:p>
+            <a:r>
+              <a:rPr lang="en-US" sz="2800" dirty="0">
+                <a:latin typeface="Segoe UI" panose="020B0502040204020203" pitchFamily="34" charset="0"/>
+                <a:cs typeface="Segoe UI" panose="020B0502040204020203" pitchFamily="34" charset="0"/>
+              </a:rPr>
+              <a:t>Education Accelerator Common -&gt; Primary Entities (continued)</a:t>
+            </a:r>
+          </a:p>
+        </p:txBody>
+      </p:sp>
+      <p:sp>
+        <p:nvSpPr>
+          <p:cNvPr id="37" name="Arrow: Right 36">
+            <a:extLst>
+              <a:ext uri="{FF2B5EF4-FFF2-40B4-BE49-F238E27FC236}">
+                <a16:creationId xmlns:a16="http://schemas.microsoft.com/office/drawing/2014/main" id="{C1B9BF59-FD78-4598-AEEA-8D4C555B37D4}"/>
+              </a:ext>
+            </a:extLst>
+          </p:cNvPr>
+          <p:cNvSpPr/>
+          <p:nvPr/>
+        </p:nvSpPr>
+        <p:spPr>
+          <a:xfrm>
+            <a:off x="6035040" y="3549835"/>
+            <a:ext cx="978408" cy="484632"/>
+          </a:xfrm>
+          <a:prstGeom prst="rightArrow">
+            <a:avLst/>
+          </a:prstGeom>
+          <a:ln w="28575">
+            <a:solidFill>
+              <a:srgbClr val="FFC000"/>
+            </a:solidFill>
+          </a:ln>
+        </p:spPr>
+        <p:style>
+          <a:lnRef idx="2">
+            <a:schemeClr val="accent1">
+              <a:shade val="50000"/>
+            </a:schemeClr>
+          </a:lnRef>
+          <a:fillRef idx="1">
+            <a:schemeClr val="accent1"/>
+          </a:fillRef>
+          <a:effectRef idx="0">
+            <a:schemeClr val="accent1"/>
+          </a:effectRef>
+          <a:fontRef idx="minor">
+            <a:schemeClr val="lt1"/>
+          </a:fontRef>
+        </p:style>
+        <p:txBody>
+          <a:bodyPr rtlCol="0" anchor="ctr"/>
+          <a:lstStyle/>
+          <a:p>
+            <a:pPr algn="ctr"/>
+            <a:endParaRPr lang="en-US"/>
+          </a:p>
+        </p:txBody>
+      </p:sp>
+      <p:graphicFrame>
+        <p:nvGraphicFramePr>
+          <p:cNvPr id="14" name="Table 35">
+            <a:extLst>
+              <a:ext uri="{FF2B5EF4-FFF2-40B4-BE49-F238E27FC236}">
+                <a16:creationId xmlns:a16="http://schemas.microsoft.com/office/drawing/2014/main" id="{95A951F2-E612-4A89-9DEC-D2EC6ECF0E1A}"/>
+              </a:ext>
+            </a:extLst>
+          </p:cNvPr>
+          <p:cNvGraphicFramePr>
+            <a:graphicFrameLocks noGrp="1"/>
+          </p:cNvGraphicFramePr>
+          <p:nvPr/>
+        </p:nvGraphicFramePr>
+        <p:xfrm>
+          <a:off x="7150654" y="1066267"/>
+          <a:ext cx="3757491" cy="5562600"/>
+        </p:xfrm>
+        <a:graphic>
+          <a:graphicData uri="http://schemas.openxmlformats.org/drawingml/2006/table">
+            <a:tbl>
+              <a:tblPr firstRow="1" bandRow="1">
+                <a:tableStyleId>{B301B821-A1FF-4177-AEE7-76D212191A09}</a:tableStyleId>
+              </a:tblPr>
+              <a:tblGrid>
+                <a:gridCol w="3757491">
+                  <a:extLst>
+                    <a:ext uri="{9D8B030D-6E8A-4147-A177-3AD203B41FA5}">
+                      <a16:colId xmlns:a16="http://schemas.microsoft.com/office/drawing/2014/main" val="832068167"/>
+                    </a:ext>
+                  </a:extLst>
+                </a:gridCol>
+              </a:tblGrid>
+              <a:tr h="370840">
+                <a:tc>
+                  <a:txBody>
+                    <a:bodyPr/>
+                    <a:lstStyle/>
+                    <a:p>
+                      <a:r>
+                        <a:rPr lang="en-US" sz="1400" dirty="0"/>
+                        <a:t>Entity Name</a:t>
+                      </a:r>
+                    </a:p>
+                  </a:txBody>
+                  <a:tcPr/>
+                </a:tc>
+                <a:extLst>
+                  <a:ext uri="{0D108BD9-81ED-4DB2-BD59-A6C34878D82A}">
+                    <a16:rowId xmlns:a16="http://schemas.microsoft.com/office/drawing/2014/main" val="897896226"/>
+                  </a:ext>
+                </a:extLst>
+              </a:tr>
+              <a:tr h="370840">
+                <a:tc>
+                  <a:txBody>
+                    <a:bodyPr/>
+                    <a:lstStyle/>
+                    <a:p>
+                      <a:r>
+                        <a:rPr lang="en-US" sz="1400" dirty="0"/>
+                        <a:t>Course</a:t>
+                      </a:r>
+                    </a:p>
+                  </a:txBody>
+                  <a:tcPr/>
+                </a:tc>
+                <a:extLst>
+                  <a:ext uri="{0D108BD9-81ED-4DB2-BD59-A6C34878D82A}">
+                    <a16:rowId xmlns:a16="http://schemas.microsoft.com/office/drawing/2014/main" val="3838149768"/>
+                  </a:ext>
+                </a:extLst>
+              </a:tr>
+              <a:tr h="370840">
+                <a:tc>
+                  <a:txBody>
+                    <a:bodyPr/>
+                    <a:lstStyle/>
+                    <a:p>
+                      <a:r>
+                        <a:rPr lang="en-US" sz="1400" dirty="0"/>
+                        <a:t>Course History</a:t>
+                      </a:r>
+                    </a:p>
+                  </a:txBody>
+                  <a:tcPr/>
+                </a:tc>
+                <a:extLst>
+                  <a:ext uri="{0D108BD9-81ED-4DB2-BD59-A6C34878D82A}">
+                    <a16:rowId xmlns:a16="http://schemas.microsoft.com/office/drawing/2014/main" val="2224312903"/>
+                  </a:ext>
+                </a:extLst>
+              </a:tr>
+              <a:tr h="370840">
+                <a:tc>
+                  <a:txBody>
+                    <a:bodyPr/>
+                    <a:lstStyle/>
+                    <a:p>
+                      <a:r>
+                        <a:rPr lang="en-US" sz="1400" dirty="0"/>
+                        <a:t>Course Section</a:t>
+                      </a:r>
+                    </a:p>
+                  </a:txBody>
+                  <a:tcPr/>
+                </a:tc>
+                <a:extLst>
+                  <a:ext uri="{0D108BD9-81ED-4DB2-BD59-A6C34878D82A}">
+                    <a16:rowId xmlns:a16="http://schemas.microsoft.com/office/drawing/2014/main" val="667350202"/>
+                  </a:ext>
+                </a:extLst>
+              </a:tr>
+              <a:tr h="370840">
+                <a:tc>
+                  <a:txBody>
+                    <a:bodyPr/>
+                    <a:lstStyle/>
+                    <a:p>
+                      <a:r>
+                        <a:rPr lang="en-US" sz="1400" dirty="0"/>
+                        <a:t>Credential</a:t>
+                      </a:r>
+                    </a:p>
+                  </a:txBody>
+                  <a:tcPr/>
+                </a:tc>
+                <a:extLst>
+                  <a:ext uri="{0D108BD9-81ED-4DB2-BD59-A6C34878D82A}">
+                    <a16:rowId xmlns:a16="http://schemas.microsoft.com/office/drawing/2014/main" val="3121097215"/>
+                  </a:ext>
+                </a:extLst>
+              </a:tr>
+              <a:tr h="370840">
+                <a:tc>
+                  <a:txBody>
+                    <a:bodyPr/>
+                    <a:lstStyle/>
+                    <a:p>
+                      <a:r>
+                        <a:rPr lang="en-US" sz="1400" dirty="0"/>
+                        <a:t>Education Level</a:t>
+                      </a:r>
+                    </a:p>
+                  </a:txBody>
+                  <a:tcPr/>
+                </a:tc>
+                <a:extLst>
+                  <a:ext uri="{0D108BD9-81ED-4DB2-BD59-A6C34878D82A}">
+                    <a16:rowId xmlns:a16="http://schemas.microsoft.com/office/drawing/2014/main" val="1167480664"/>
+                  </a:ext>
+                </a:extLst>
+              </a:tr>
+              <a:tr h="370840">
+                <a:tc>
+                  <a:txBody>
+                    <a:bodyPr/>
+                    <a:lstStyle/>
+                    <a:p>
+                      <a:r>
+                        <a:rPr lang="en-US" sz="1400" dirty="0"/>
+                        <a:t>External System</a:t>
+                      </a:r>
+                    </a:p>
+                  </a:txBody>
+                  <a:tcPr/>
+                </a:tc>
+                <a:extLst>
+                  <a:ext uri="{0D108BD9-81ED-4DB2-BD59-A6C34878D82A}">
+                    <a16:rowId xmlns:a16="http://schemas.microsoft.com/office/drawing/2014/main" val="3608888253"/>
+                  </a:ext>
+                </a:extLst>
+              </a:tr>
+              <a:tr h="370840">
+                <a:tc>
+                  <a:txBody>
+                    <a:bodyPr/>
+                    <a:lstStyle/>
+                    <a:p>
+                      <a:r>
+                        <a:rPr lang="en-US" sz="1400" dirty="0"/>
+                        <a:t>External System Identifier</a:t>
+                      </a:r>
+                    </a:p>
+                  </a:txBody>
+                  <a:tcPr/>
+                </a:tc>
+                <a:extLst>
+                  <a:ext uri="{0D108BD9-81ED-4DB2-BD59-A6C34878D82A}">
+                    <a16:rowId xmlns:a16="http://schemas.microsoft.com/office/drawing/2014/main" val="1121510914"/>
+                  </a:ext>
+                </a:extLst>
+              </a:tr>
+              <a:tr h="370840">
+                <a:tc>
+                  <a:txBody>
+                    <a:bodyPr/>
+                    <a:lstStyle/>
+                    <a:p>
+                      <a:r>
+                        <a:rPr lang="en-US" sz="1400" dirty="0"/>
+                        <a:t>Extra Curricular Activity</a:t>
+                      </a:r>
+                    </a:p>
+                  </a:txBody>
+                  <a:tcPr/>
+                </a:tc>
+                <a:extLst>
+                  <a:ext uri="{0D108BD9-81ED-4DB2-BD59-A6C34878D82A}">
+                    <a16:rowId xmlns:a16="http://schemas.microsoft.com/office/drawing/2014/main" val="4086679046"/>
+                  </a:ext>
+                </a:extLst>
+              </a:tr>
+              <a:tr h="370840">
+                <a:tc>
+                  <a:txBody>
+                    <a:bodyPr/>
+                    <a:lstStyle/>
+                    <a:p>
+                      <a:r>
+                        <a:rPr lang="en-US" sz="1400" dirty="0"/>
+                        <a:t>Extra Curricular Participant</a:t>
+                      </a:r>
+                    </a:p>
+                  </a:txBody>
+                  <a:tcPr/>
+                </a:tc>
+                <a:extLst>
+                  <a:ext uri="{0D108BD9-81ED-4DB2-BD59-A6C34878D82A}">
+                    <a16:rowId xmlns:a16="http://schemas.microsoft.com/office/drawing/2014/main" val="2738240582"/>
+                  </a:ext>
+                </a:extLst>
+              </a:tr>
+              <a:tr h="370840">
+                <a:tc>
+                  <a:txBody>
+                    <a:bodyPr/>
+                    <a:lstStyle/>
+                    <a:p>
+                      <a:r>
+                        <a:rPr lang="en-US" sz="1400" dirty="0"/>
+                        <a:t>Internship</a:t>
+                      </a:r>
+                    </a:p>
+                  </a:txBody>
+                  <a:tcPr/>
+                </a:tc>
+                <a:extLst>
+                  <a:ext uri="{0D108BD9-81ED-4DB2-BD59-A6C34878D82A}">
+                    <a16:rowId xmlns:a16="http://schemas.microsoft.com/office/drawing/2014/main" val="160817269"/>
+                  </a:ext>
+                </a:extLst>
+              </a:tr>
+              <a:tr h="370840">
+                <a:tc>
+                  <a:txBody>
+                    <a:bodyPr/>
+                    <a:lstStyle/>
+                    <a:p>
+                      <a:r>
+                        <a:rPr lang="en-US" sz="1400" dirty="0"/>
+                        <a:t>Internship Applicant</a:t>
+                      </a:r>
+                    </a:p>
+                  </a:txBody>
+                  <a:tcPr/>
+                </a:tc>
+                <a:extLst>
+                  <a:ext uri="{0D108BD9-81ED-4DB2-BD59-A6C34878D82A}">
+                    <a16:rowId xmlns:a16="http://schemas.microsoft.com/office/drawing/2014/main" val="2253832558"/>
+                  </a:ext>
+                </a:extLst>
+              </a:tr>
+              <a:tr h="370840">
+                <a:tc>
+                  <a:txBody>
+                    <a:bodyPr/>
+                    <a:lstStyle/>
+                    <a:p>
+                      <a:r>
+                        <a:rPr lang="en-US" sz="1400" dirty="0"/>
+                        <a:t>Previous Education</a:t>
+                      </a:r>
+                    </a:p>
+                  </a:txBody>
+                  <a:tcPr/>
+                </a:tc>
+                <a:extLst>
+                  <a:ext uri="{0D108BD9-81ED-4DB2-BD59-A6C34878D82A}">
+                    <a16:rowId xmlns:a16="http://schemas.microsoft.com/office/drawing/2014/main" val="1604952704"/>
+                  </a:ext>
+                </a:extLst>
+              </a:tr>
+              <a:tr h="370840">
+                <a:tc>
+                  <a:txBody>
+                    <a:bodyPr/>
+                    <a:lstStyle/>
+                    <a:p>
+                      <a:r>
+                        <a:rPr lang="en-US" sz="1400" dirty="0"/>
+                        <a:t>Program</a:t>
+                      </a:r>
+                    </a:p>
+                  </a:txBody>
+                  <a:tcPr/>
+                </a:tc>
+                <a:extLst>
+                  <a:ext uri="{0D108BD9-81ED-4DB2-BD59-A6C34878D82A}">
+                    <a16:rowId xmlns:a16="http://schemas.microsoft.com/office/drawing/2014/main" val="107095759"/>
+                  </a:ext>
+                </a:extLst>
+              </a:tr>
+              <a:tr h="370840">
+                <a:tc>
+                  <a:txBody>
+                    <a:bodyPr/>
+                    <a:lstStyle/>
+                    <a:p>
+                      <a:r>
+                        <a:rPr lang="en-US" sz="1400" dirty="0"/>
+                        <a:t>Program Level</a:t>
+                      </a:r>
+                    </a:p>
+                  </a:txBody>
+                  <a:tcPr/>
+                </a:tc>
+                <a:extLst>
+                  <a:ext uri="{0D108BD9-81ED-4DB2-BD59-A6C34878D82A}">
+                    <a16:rowId xmlns:a16="http://schemas.microsoft.com/office/drawing/2014/main" val="2576586552"/>
+                  </a:ext>
+                </a:extLst>
+              </a:tr>
+            </a:tbl>
+          </a:graphicData>
+        </a:graphic>
+      </p:graphicFrame>
+      <p:grpSp>
+        <p:nvGrpSpPr>
+          <p:cNvPr id="16" name="Group 15">
+            <a:extLst>
+              <a:ext uri="{FF2B5EF4-FFF2-40B4-BE49-F238E27FC236}">
+                <a16:creationId xmlns:a16="http://schemas.microsoft.com/office/drawing/2014/main" id="{BEE0168D-8C4D-B628-ED14-092FA3B4DEDD}"/>
+              </a:ext>
+            </a:extLst>
+          </p:cNvPr>
+          <p:cNvGrpSpPr/>
+          <p:nvPr/>
+        </p:nvGrpSpPr>
+        <p:grpSpPr>
+          <a:xfrm>
+            <a:off x="865920" y="2197189"/>
+            <a:ext cx="5031914" cy="2102360"/>
+            <a:chOff x="865920" y="2230240"/>
+            <a:chExt cx="5031914" cy="2102360"/>
+          </a:xfrm>
+        </p:grpSpPr>
+        <p:sp>
+          <p:nvSpPr>
+            <p:cNvPr id="17" name="Rectangle 16">
+              <a:extLst>
+                <a:ext uri="{FF2B5EF4-FFF2-40B4-BE49-F238E27FC236}">
+                  <a16:creationId xmlns:a16="http://schemas.microsoft.com/office/drawing/2014/main" id="{B5AA1D89-76D7-131A-3FA7-F170DBAB7CEE}"/>
+                </a:ext>
+              </a:extLst>
+            </p:cNvPr>
+            <p:cNvSpPr/>
+            <p:nvPr/>
+          </p:nvSpPr>
+          <p:spPr>
+            <a:xfrm>
+              <a:off x="865924" y="4038736"/>
+              <a:ext cx="5031910" cy="293864"/>
+            </a:xfrm>
+            <a:prstGeom prst="rect">
+              <a:avLst/>
+            </a:prstGeom>
+            <a:solidFill>
+              <a:srgbClr val="FFEFBD"/>
+            </a:solidFill>
+          </p:spPr>
+          <p:style>
+            <a:lnRef idx="2">
+              <a:schemeClr val="accent4">
+                <a:shade val="50000"/>
+              </a:schemeClr>
+            </a:lnRef>
+            <a:fillRef idx="1">
+              <a:schemeClr val="accent4"/>
+            </a:fillRef>
+            <a:effectRef idx="0">
+              <a:schemeClr val="accent4"/>
+            </a:effectRef>
+            <a:fontRef idx="minor">
+              <a:schemeClr val="lt1"/>
+            </a:fontRef>
+          </p:style>
+          <p:txBody>
+            <a:bodyPr rtlCol="0" anchor="ctr"/>
+            <a:lstStyle/>
+            <a:p>
+              <a:pPr algn="ctr"/>
+              <a:r>
+                <a:rPr lang="en-US" sz="800" dirty="0">
+                  <a:solidFill>
+                    <a:schemeClr val="tx1"/>
+                  </a:solidFill>
+                  <a:latin typeface="Segoe UI" panose="020B0502040204020203" pitchFamily="34" charset="0"/>
+                  <a:cs typeface="Segoe UI" panose="020B0502040204020203" pitchFamily="34" charset="0"/>
+                </a:rPr>
+                <a:t>CDM Common</a:t>
+              </a:r>
+            </a:p>
+          </p:txBody>
+        </p:sp>
+        <p:sp>
+          <p:nvSpPr>
+            <p:cNvPr id="18" name="Rectangle 17">
+              <a:extLst>
+                <a:ext uri="{FF2B5EF4-FFF2-40B4-BE49-F238E27FC236}">
+                  <a16:creationId xmlns:a16="http://schemas.microsoft.com/office/drawing/2014/main" id="{FC850814-B37F-AF2A-FCB4-E10D70699CE5}"/>
+                </a:ext>
+              </a:extLst>
+            </p:cNvPr>
+            <p:cNvSpPr/>
+            <p:nvPr/>
+          </p:nvSpPr>
+          <p:spPr>
+            <a:xfrm>
+              <a:off x="865921" y="3677036"/>
+              <a:ext cx="5031913" cy="293864"/>
+            </a:xfrm>
+            <a:prstGeom prst="rect">
+              <a:avLst/>
+            </a:prstGeom>
+          </p:spPr>
+          <p:style>
+            <a:lnRef idx="2">
+              <a:schemeClr val="accent1">
+                <a:shade val="50000"/>
+              </a:schemeClr>
+            </a:lnRef>
+            <a:fillRef idx="1">
+              <a:schemeClr val="accent1"/>
+            </a:fillRef>
+            <a:effectRef idx="0">
+              <a:schemeClr val="accent1"/>
+            </a:effectRef>
+            <a:fontRef idx="minor">
+              <a:schemeClr val="lt1"/>
+            </a:fontRef>
+          </p:style>
+          <p:txBody>
+            <a:bodyPr rtlCol="0" anchor="ctr"/>
+            <a:lstStyle/>
+            <a:p>
+              <a:pPr algn="ctr"/>
+              <a:r>
+                <a:rPr lang="en-US" sz="800" dirty="0">
+                  <a:solidFill>
+                    <a:schemeClr val="bg1"/>
+                  </a:solidFill>
+                  <a:latin typeface="Segoe UI" panose="020B0502040204020203" pitchFamily="34" charset="0"/>
+                  <a:cs typeface="Segoe UI" panose="020B0502040204020203" pitchFamily="34" charset="0"/>
+                </a:rPr>
+                <a:t>Education Accelerator Common</a:t>
+              </a:r>
+            </a:p>
+          </p:txBody>
+        </p:sp>
+        <p:sp>
+          <p:nvSpPr>
+            <p:cNvPr id="19" name="Rectangle 18">
+              <a:extLst>
+                <a:ext uri="{FF2B5EF4-FFF2-40B4-BE49-F238E27FC236}">
+                  <a16:creationId xmlns:a16="http://schemas.microsoft.com/office/drawing/2014/main" id="{AE4F56C5-AD78-C476-CC45-75D56C84BD7B}"/>
+                </a:ext>
+              </a:extLst>
+            </p:cNvPr>
+            <p:cNvSpPr/>
+            <p:nvPr/>
+          </p:nvSpPr>
+          <p:spPr>
+            <a:xfrm>
+              <a:off x="3488769" y="2591098"/>
+              <a:ext cx="2409063" cy="293864"/>
+            </a:xfrm>
+            <a:prstGeom prst="rect">
+              <a:avLst/>
+            </a:prstGeom>
+            <a:solidFill>
+              <a:srgbClr val="CFDBF0"/>
+            </a:solidFill>
+          </p:spPr>
+          <p:style>
+            <a:lnRef idx="2">
+              <a:schemeClr val="accent1">
+                <a:shade val="50000"/>
+              </a:schemeClr>
+            </a:lnRef>
+            <a:fillRef idx="1">
+              <a:schemeClr val="accent1"/>
+            </a:fillRef>
+            <a:effectRef idx="0">
+              <a:schemeClr val="accent1"/>
+            </a:effectRef>
+            <a:fontRef idx="minor">
+              <a:schemeClr val="lt1"/>
+            </a:fontRef>
+          </p:style>
+          <p:txBody>
+            <a:bodyPr rtlCol="0" anchor="ctr"/>
+            <a:lstStyle/>
+            <a:p>
+              <a:pPr algn="ctr"/>
+              <a:r>
+                <a:rPr lang="en-US" sz="800" dirty="0">
+                  <a:solidFill>
+                    <a:schemeClr val="tx1"/>
+                  </a:solidFill>
+                  <a:latin typeface="Segoe UI" panose="020B0502040204020203" pitchFamily="34" charset="0"/>
+                  <a:cs typeface="Segoe UI" panose="020B0502040204020203" pitchFamily="34" charset="0"/>
+                </a:rPr>
+                <a:t>Dynamics 365 Higher Education Accelerator Canvas Model Apps</a:t>
+              </a:r>
+            </a:p>
+          </p:txBody>
+        </p:sp>
+        <p:sp>
+          <p:nvSpPr>
+            <p:cNvPr id="20" name="Rectangle 19">
+              <a:extLst>
+                <a:ext uri="{FF2B5EF4-FFF2-40B4-BE49-F238E27FC236}">
+                  <a16:creationId xmlns:a16="http://schemas.microsoft.com/office/drawing/2014/main" id="{955D922D-FBE8-5A18-1588-19F357F3D919}"/>
+                </a:ext>
+              </a:extLst>
+            </p:cNvPr>
+            <p:cNvSpPr/>
+            <p:nvPr/>
+          </p:nvSpPr>
+          <p:spPr>
+            <a:xfrm>
+              <a:off x="865921" y="2953638"/>
+              <a:ext cx="5031911" cy="293864"/>
+            </a:xfrm>
+            <a:prstGeom prst="rect">
+              <a:avLst/>
+            </a:prstGeom>
+            <a:solidFill>
+              <a:srgbClr val="CFDBF0"/>
+            </a:solidFill>
+          </p:spPr>
+          <p:style>
+            <a:lnRef idx="2">
+              <a:schemeClr val="accent1">
+                <a:shade val="50000"/>
+              </a:schemeClr>
+            </a:lnRef>
+            <a:fillRef idx="1">
+              <a:schemeClr val="accent1"/>
+            </a:fillRef>
+            <a:effectRef idx="0">
+              <a:schemeClr val="accent1"/>
+            </a:effectRef>
+            <a:fontRef idx="minor">
+              <a:schemeClr val="lt1"/>
+            </a:fontRef>
+          </p:style>
+          <p:txBody>
+            <a:bodyPr rtlCol="0" anchor="ctr"/>
+            <a:lstStyle/>
+            <a:p>
+              <a:pPr algn="ctr"/>
+              <a:r>
+                <a:rPr lang="en-US" sz="800" dirty="0">
+                  <a:solidFill>
+                    <a:schemeClr val="tx1"/>
+                  </a:solidFill>
+                  <a:latin typeface="Segoe UI" panose="020B0502040204020203" pitchFamily="34" charset="0"/>
+                  <a:cs typeface="Segoe UI" panose="020B0502040204020203" pitchFamily="34" charset="0"/>
+                </a:rPr>
+                <a:t>Dynamics 365 Higher Education Accelerator</a:t>
+              </a:r>
+            </a:p>
+          </p:txBody>
+        </p:sp>
+        <p:sp>
+          <p:nvSpPr>
+            <p:cNvPr id="21" name="Rectangle 20">
+              <a:extLst>
+                <a:ext uri="{FF2B5EF4-FFF2-40B4-BE49-F238E27FC236}">
+                  <a16:creationId xmlns:a16="http://schemas.microsoft.com/office/drawing/2014/main" id="{0211B7A3-7893-3158-1D7F-CD982910BB07}"/>
+                </a:ext>
+              </a:extLst>
+            </p:cNvPr>
+            <p:cNvSpPr/>
+            <p:nvPr/>
+          </p:nvSpPr>
+          <p:spPr>
+            <a:xfrm>
+              <a:off x="865922" y="2230240"/>
+              <a:ext cx="2535568" cy="293864"/>
+            </a:xfrm>
+            <a:prstGeom prst="rect">
+              <a:avLst/>
+            </a:prstGeom>
+            <a:solidFill>
+              <a:srgbClr val="CFDBF0"/>
+            </a:solidFill>
+          </p:spPr>
+          <p:style>
+            <a:lnRef idx="2">
+              <a:schemeClr val="accent1">
+                <a:shade val="50000"/>
+              </a:schemeClr>
+            </a:lnRef>
+            <a:fillRef idx="1">
+              <a:schemeClr val="accent1"/>
+            </a:fillRef>
+            <a:effectRef idx="0">
+              <a:schemeClr val="accent1"/>
+            </a:effectRef>
+            <a:fontRef idx="minor">
+              <a:schemeClr val="lt1"/>
+            </a:fontRef>
+          </p:style>
+          <p:txBody>
+            <a:bodyPr rtlCol="0" anchor="ctr"/>
+            <a:lstStyle/>
+            <a:p>
+              <a:pPr algn="ctr"/>
+              <a:endParaRPr lang="en-US" sz="800" dirty="0">
+                <a:solidFill>
+                  <a:schemeClr val="tx1"/>
+                </a:solidFill>
+                <a:latin typeface="Segoe UI" panose="020B0502040204020203" pitchFamily="34" charset="0"/>
+                <a:cs typeface="Segoe UI" panose="020B0502040204020203" pitchFamily="34" charset="0"/>
+              </a:endParaRPr>
+            </a:p>
+            <a:p>
+              <a:pPr algn="ctr"/>
+              <a:r>
+                <a:rPr lang="en-US" sz="800" dirty="0">
+                  <a:solidFill>
+                    <a:schemeClr val="tx1"/>
+                  </a:solidFill>
+                  <a:latin typeface="Segoe UI" panose="020B0502040204020203" pitchFamily="34" charset="0"/>
+                  <a:cs typeface="Segoe UI" panose="020B0502040204020203" pitchFamily="34" charset="0"/>
+                </a:rPr>
+                <a:t>Dynamics 365 Higher Ed Portal</a:t>
+              </a:r>
+            </a:p>
+            <a:p>
+              <a:pPr algn="ctr"/>
+              <a:endParaRPr lang="en-US" sz="800" dirty="0">
+                <a:solidFill>
+                  <a:schemeClr val="tx1"/>
+                </a:solidFill>
+                <a:latin typeface="Segoe UI" panose="020B0502040204020203" pitchFamily="34" charset="0"/>
+                <a:cs typeface="Segoe UI" panose="020B0502040204020203" pitchFamily="34" charset="0"/>
+              </a:endParaRPr>
+            </a:p>
+          </p:txBody>
+        </p:sp>
+        <p:sp>
+          <p:nvSpPr>
+            <p:cNvPr id="22" name="Rectangle 21">
+              <a:extLst>
+                <a:ext uri="{FF2B5EF4-FFF2-40B4-BE49-F238E27FC236}">
+                  <a16:creationId xmlns:a16="http://schemas.microsoft.com/office/drawing/2014/main" id="{D390E200-CA14-EDE4-C2E0-90D6BDD60D40}"/>
+                </a:ext>
+              </a:extLst>
+            </p:cNvPr>
+            <p:cNvSpPr/>
+            <p:nvPr/>
+          </p:nvSpPr>
+          <p:spPr>
+            <a:xfrm>
+              <a:off x="865921" y="2591939"/>
+              <a:ext cx="2535570" cy="293864"/>
+            </a:xfrm>
+            <a:prstGeom prst="rect">
+              <a:avLst/>
+            </a:prstGeom>
+            <a:solidFill>
+              <a:srgbClr val="FFEFBD"/>
+            </a:solidFill>
+          </p:spPr>
+          <p:style>
+            <a:lnRef idx="2">
+              <a:schemeClr val="accent4">
+                <a:shade val="50000"/>
+              </a:schemeClr>
+            </a:lnRef>
+            <a:fillRef idx="1">
+              <a:schemeClr val="accent4"/>
+            </a:fillRef>
+            <a:effectRef idx="0">
+              <a:schemeClr val="accent4"/>
+            </a:effectRef>
+            <a:fontRef idx="minor">
+              <a:schemeClr val="lt1"/>
+            </a:fontRef>
+          </p:style>
+          <p:txBody>
+            <a:bodyPr rtlCol="0" anchor="ctr"/>
+            <a:lstStyle/>
+            <a:p>
+              <a:pPr algn="ctr"/>
+              <a:r>
+                <a:rPr lang="en-US" sz="800" dirty="0">
+                  <a:solidFill>
+                    <a:schemeClr val="tx1"/>
+                  </a:solidFill>
+                  <a:latin typeface="Segoe UI" panose="020B0502040204020203" pitchFamily="34" charset="0"/>
+                  <a:cs typeface="Segoe UI" panose="020B0502040204020203" pitchFamily="34" charset="0"/>
+                </a:rPr>
+                <a:t>PowerApps Portal</a:t>
+              </a:r>
+            </a:p>
+          </p:txBody>
+        </p:sp>
+        <p:sp>
+          <p:nvSpPr>
+            <p:cNvPr id="23" name="Rectangle 22">
+              <a:extLst>
+                <a:ext uri="{FF2B5EF4-FFF2-40B4-BE49-F238E27FC236}">
+                  <a16:creationId xmlns:a16="http://schemas.microsoft.com/office/drawing/2014/main" id="{721784C4-D89C-34F5-3B37-F051E8B0555D}"/>
+                </a:ext>
+              </a:extLst>
+            </p:cNvPr>
+            <p:cNvSpPr/>
+            <p:nvPr/>
+          </p:nvSpPr>
+          <p:spPr>
+            <a:xfrm>
+              <a:off x="865920" y="3315337"/>
+              <a:ext cx="5031911" cy="293864"/>
+            </a:xfrm>
+            <a:prstGeom prst="rect">
+              <a:avLst/>
+            </a:prstGeom>
+            <a:solidFill>
+              <a:srgbClr val="CFDBF0"/>
+            </a:solidFill>
+          </p:spPr>
+          <p:style>
+            <a:lnRef idx="2">
+              <a:schemeClr val="accent1">
+                <a:shade val="50000"/>
+              </a:schemeClr>
+            </a:lnRef>
+            <a:fillRef idx="1">
+              <a:schemeClr val="accent1"/>
+            </a:fillRef>
+            <a:effectRef idx="0">
+              <a:schemeClr val="accent1"/>
+            </a:effectRef>
+            <a:fontRef idx="minor">
+              <a:schemeClr val="lt1"/>
+            </a:fontRef>
+          </p:style>
+          <p:txBody>
+            <a:bodyPr rtlCol="0" anchor="ctr"/>
+            <a:lstStyle/>
+            <a:p>
+              <a:pPr algn="ctr"/>
+              <a:r>
+                <a:rPr lang="en-US" sz="800" dirty="0">
+                  <a:solidFill>
+                    <a:schemeClr val="tx1"/>
+                  </a:solidFill>
+                  <a:latin typeface="Segoe UI" panose="020B0502040204020203" pitchFamily="34" charset="0"/>
+                  <a:cs typeface="Segoe UI" panose="020B0502040204020203" pitchFamily="34" charset="0"/>
+                </a:rPr>
+                <a:t>Education Accelerator Connection Roles</a:t>
+              </a:r>
+            </a:p>
+          </p:txBody>
+        </p:sp>
+      </p:grpSp>
+    </p:spTree>
+    <p:extLst>
+      <p:ext uri="{BB962C8B-B14F-4D97-AF65-F5344CB8AC3E}">
+        <p14:creationId xmlns:p14="http://schemas.microsoft.com/office/powerpoint/2010/main" val="3456711807"/>
+      </p:ext>
+    </p:extLst>
+  </p:cSld>
+  <p:clrMapOvr>
+    <a:masterClrMapping/>
+  </p:clrMapOvr>
+</p:sld>
+</file>
+
+<file path=ppt/slides/slide4.xml><?xml version="1.0" encoding="utf-8"?>
 <p:sld xmlns:a="http://schemas.openxmlformats.org/drawingml/2006/main" xmlns:r="http://schemas.openxmlformats.org/officeDocument/2006/relationships" xmlns:p="http://schemas.openxmlformats.org/presentationml/2006/main">
   <p:cSld>
     <p:spTree>
@@ -10512,13 +12214,7 @@
           <p:cNvGraphicFramePr>
             <a:graphicFrameLocks noGrp="1"/>
           </p:cNvGraphicFramePr>
-          <p:nvPr>
-            <p:extLst>
-              <p:ext uri="{D42A27DB-BD31-4B8C-83A1-F6EECF244321}">
-                <p14:modId xmlns:p14="http://schemas.microsoft.com/office/powerpoint/2010/main" val="3734609968"/>
-              </p:ext>
-            </p:extLst>
-          </p:nvPr>
+          <p:nvPr/>
         </p:nvGraphicFramePr>
         <p:xfrm>
           <a:off x="7150654" y="1066267"/>
@@ -10567,46 +12263,6 @@
                     <a:p>
                       <a:r>
                         <a:rPr lang="en-US" sz="1400" dirty="0"/>
-                        <a:t>Program</a:t>
-                      </a:r>
-                    </a:p>
-                  </a:txBody>
-                  <a:tcPr/>
-                </a:tc>
-                <a:extLst>
-                  <a:ext uri="{0D108BD9-81ED-4DB2-BD59-A6C34878D82A}">
-                    <a16:rowId xmlns:a16="http://schemas.microsoft.com/office/drawing/2014/main" val="675831119"/>
-                  </a:ext>
-                </a:extLst>
-              </a:tr>
-              <a:tr h="370840">
-                <a:tc>
-                  <a:txBody>
-                    <a:bodyPr/>
-                    <a:lstStyle/>
-                    <a:p>
-                      <a:r>
-                        <a:rPr lang="en-US" sz="1400" dirty="0"/>
-                        <a:t>Program Level</a:t>
-                      </a:r>
-                    </a:p>
-                  </a:txBody>
-                  <a:tcPr/>
-                </a:tc>
-                <a:extLst>
-                  <a:ext uri="{0D108BD9-81ED-4DB2-BD59-A6C34878D82A}">
-                    <a16:rowId xmlns:a16="http://schemas.microsoft.com/office/drawing/2014/main" val="2136345013"/>
-                  </a:ext>
-                </a:extLst>
-              </a:tr>
-              <a:tr h="370840">
-                <a:tc>
-                  <a:txBody>
-                    <a:bodyPr/>
-                    <a:lstStyle/>
-                    <a:p>
-                      <a:r>
-                        <a:rPr lang="en-US" sz="1400" dirty="0"/>
                         <a:t>Program Requirement</a:t>
                       </a:r>
                     </a:p>
@@ -10736,6 +12392,46 @@
                 <a:extLst>
                   <a:ext uri="{0D108BD9-81ED-4DB2-BD59-A6C34878D82A}">
                     <a16:rowId xmlns:a16="http://schemas.microsoft.com/office/drawing/2014/main" val="1167480664"/>
+                  </a:ext>
+                </a:extLst>
+              </a:tr>
+              <a:tr h="370840">
+                <a:tc>
+                  <a:txBody>
+                    <a:bodyPr/>
+                    <a:lstStyle/>
+                    <a:p>
+                      <a:r>
+                        <a:rPr lang="en-US" sz="1400" dirty="0"/>
+                        <a:t>School Calendar</a:t>
+                      </a:r>
+                    </a:p>
+                  </a:txBody>
+                  <a:tcPr/>
+                </a:tc>
+                <a:extLst>
+                  <a:ext uri="{0D108BD9-81ED-4DB2-BD59-A6C34878D82A}">
+                    <a16:rowId xmlns:a16="http://schemas.microsoft.com/office/drawing/2014/main" val="64204027"/>
+                  </a:ext>
+                </a:extLst>
+              </a:tr>
+              <a:tr h="370840">
+                <a:tc>
+                  <a:txBody>
+                    <a:bodyPr/>
+                    <a:lstStyle/>
+                    <a:p>
+                      <a:r>
+                        <a:rPr lang="en-US" sz="1400" dirty="0"/>
+                        <a:t>School Calendar Date</a:t>
+                      </a:r>
+                    </a:p>
+                  </a:txBody>
+                  <a:tcPr/>
+                </a:tc>
+                <a:extLst>
+                  <a:ext uri="{0D108BD9-81ED-4DB2-BD59-A6C34878D82A}">
+                    <a16:rowId xmlns:a16="http://schemas.microsoft.com/office/drawing/2014/main" val="3529065800"/>
                   </a:ext>
                 </a:extLst>
               </a:tr>
@@ -10845,10 +12541,10 @@
       </p:graphicFrame>
       <p:grpSp>
         <p:nvGrpSpPr>
-          <p:cNvPr id="15" name="Group 14">
+          <p:cNvPr id="13" name="Group 12">
             <a:extLst>
               <a:ext uri="{FF2B5EF4-FFF2-40B4-BE49-F238E27FC236}">
-                <a16:creationId xmlns:a16="http://schemas.microsoft.com/office/drawing/2014/main" id="{5D7408FD-1D2D-438C-8605-327A10932CAD}"/>
+                <a16:creationId xmlns:a16="http://schemas.microsoft.com/office/drawing/2014/main" id="{98F86E01-D07F-B877-0EC5-626FD6D81828}"/>
               </a:ext>
             </a:extLst>
           </p:cNvPr>
@@ -10857,7 +12553,7 @@
         </p:nvGrpSpPr>
         <p:grpSpPr>
           <a:xfrm>
-            <a:off x="865920" y="2230240"/>
+            <a:off x="865920" y="2197189"/>
             <a:ext cx="5031914" cy="2102360"/>
             <a:chOff x="865920" y="2230240"/>
             <a:chExt cx="5031914" cy="2102360"/>
@@ -10865,10 +12561,10 @@
         </p:grpSpPr>
         <p:sp>
           <p:nvSpPr>
-            <p:cNvPr id="16" name="Rectangle 15">
+            <p:cNvPr id="23" name="Rectangle 22">
               <a:extLst>
                 <a:ext uri="{FF2B5EF4-FFF2-40B4-BE49-F238E27FC236}">
-                  <a16:creationId xmlns:a16="http://schemas.microsoft.com/office/drawing/2014/main" id="{2EB2403D-CB7C-459B-B55D-B90078133AB5}"/>
+                  <a16:creationId xmlns:a16="http://schemas.microsoft.com/office/drawing/2014/main" id="{224B62FD-4BB5-3EE4-A269-A3BC1E003DD6}"/>
                 </a:ext>
               </a:extLst>
             </p:cNvPr>
@@ -10923,10 +12619,10 @@
         </p:sp>
         <p:sp>
           <p:nvSpPr>
-            <p:cNvPr id="17" name="Rectangle 16">
+            <p:cNvPr id="24" name="Rectangle 23">
               <a:extLst>
                 <a:ext uri="{FF2B5EF4-FFF2-40B4-BE49-F238E27FC236}">
-                  <a16:creationId xmlns:a16="http://schemas.microsoft.com/office/drawing/2014/main" id="{82B34C16-D87D-477E-A44C-59A2C44AC7E5}"/>
+                  <a16:creationId xmlns:a16="http://schemas.microsoft.com/office/drawing/2014/main" id="{9DE5BE72-54AD-4C7E-2684-2B117D27A5ED}"/>
                 </a:ext>
               </a:extLst>
             </p:cNvPr>
@@ -10971,17 +12667,17 @@
                   <a:latin typeface="Segoe UI" panose="020B0502040204020203" pitchFamily="34" charset="0"/>
                   <a:cs typeface="Segoe UI" panose="020B0502040204020203" pitchFamily="34" charset="0"/>
                 </a:rPr>
-                <a:t>Education Accelerator Common Common</a:t>
+                <a:t>Education Accelerator Common</a:t>
               </a:r>
             </a:p>
           </p:txBody>
         </p:sp>
         <p:sp>
           <p:nvSpPr>
-            <p:cNvPr id="18" name="Rectangle 17">
+            <p:cNvPr id="25" name="Rectangle 24">
               <a:extLst>
                 <a:ext uri="{FF2B5EF4-FFF2-40B4-BE49-F238E27FC236}">
-                  <a16:creationId xmlns:a16="http://schemas.microsoft.com/office/drawing/2014/main" id="{7E79039D-98D9-4920-834D-A8101245EBC9}"/>
+                  <a16:creationId xmlns:a16="http://schemas.microsoft.com/office/drawing/2014/main" id="{937549C4-FB58-5DD8-C67D-138D223EDFD8}"/>
                 </a:ext>
               </a:extLst>
             </p:cNvPr>
@@ -11029,17 +12725,17 @@
                   <a:latin typeface="Segoe UI" panose="020B0502040204020203" pitchFamily="34" charset="0"/>
                   <a:cs typeface="Segoe UI" panose="020B0502040204020203" pitchFamily="34" charset="0"/>
                 </a:rPr>
-                <a:t>Dynamics 365 Higher Education Accelerator Common Canvas Model Apps</a:t>
+                <a:t>Dynamics 365 Higher Education Accelerator Canvas Model Apps</a:t>
               </a:r>
             </a:p>
           </p:txBody>
         </p:sp>
         <p:sp>
           <p:nvSpPr>
-            <p:cNvPr id="19" name="Rectangle 18">
+            <p:cNvPr id="26" name="Rectangle 25">
               <a:extLst>
                 <a:ext uri="{FF2B5EF4-FFF2-40B4-BE49-F238E27FC236}">
-                  <a16:creationId xmlns:a16="http://schemas.microsoft.com/office/drawing/2014/main" id="{AE4B2216-8902-466D-B356-89197358A26F}"/>
+                  <a16:creationId xmlns:a16="http://schemas.microsoft.com/office/drawing/2014/main" id="{EA97E35D-F775-3944-2912-47ACB34B10D4}"/>
                 </a:ext>
               </a:extLst>
             </p:cNvPr>
@@ -11087,17 +12783,17 @@
                   <a:latin typeface="Segoe UI" panose="020B0502040204020203" pitchFamily="34" charset="0"/>
                   <a:cs typeface="Segoe UI" panose="020B0502040204020203" pitchFamily="34" charset="0"/>
                 </a:rPr>
-                <a:t>Dynamics 365 Higher Education Accelerator Common</a:t>
+                <a:t>Dynamics 365 Higher Education Accelerator</a:t>
               </a:r>
             </a:p>
           </p:txBody>
         </p:sp>
         <p:sp>
           <p:nvSpPr>
-            <p:cNvPr id="20" name="Rectangle 19">
+            <p:cNvPr id="27" name="Rectangle 26">
               <a:extLst>
                 <a:ext uri="{FF2B5EF4-FFF2-40B4-BE49-F238E27FC236}">
-                  <a16:creationId xmlns:a16="http://schemas.microsoft.com/office/drawing/2014/main" id="{45A0805B-CA6E-4C5E-90C9-8D4254DA90B5}"/>
+                  <a16:creationId xmlns:a16="http://schemas.microsoft.com/office/drawing/2014/main" id="{1CCE4AFC-CE7E-7483-5BDB-EF420A2B8F71}"/>
                 </a:ext>
               </a:extLst>
             </p:cNvPr>
@@ -11172,10 +12868,10 @@
         </p:sp>
         <p:sp>
           <p:nvSpPr>
-            <p:cNvPr id="21" name="Rectangle 20">
+            <p:cNvPr id="28" name="Rectangle 27">
               <a:extLst>
                 <a:ext uri="{FF2B5EF4-FFF2-40B4-BE49-F238E27FC236}">
-                  <a16:creationId xmlns:a16="http://schemas.microsoft.com/office/drawing/2014/main" id="{870DD189-9AC8-4A90-9E7E-FE62857DCF6A}"/>
+                  <a16:creationId xmlns:a16="http://schemas.microsoft.com/office/drawing/2014/main" id="{E81D6336-EF33-7708-DE34-23F99A30CC96}"/>
                 </a:ext>
               </a:extLst>
             </p:cNvPr>
@@ -11230,10 +12926,10 @@
         </p:sp>
         <p:sp>
           <p:nvSpPr>
-            <p:cNvPr id="22" name="Rectangle 21">
+            <p:cNvPr id="29" name="Rectangle 28">
               <a:extLst>
                 <a:ext uri="{FF2B5EF4-FFF2-40B4-BE49-F238E27FC236}">
-                  <a16:creationId xmlns:a16="http://schemas.microsoft.com/office/drawing/2014/main" id="{7C06244F-14A9-4FFA-B6C5-246820398402}"/>
+                  <a16:creationId xmlns:a16="http://schemas.microsoft.com/office/drawing/2014/main" id="{C65CE6EB-B028-05AB-798C-B23383399074}"/>
                 </a:ext>
               </a:extLst>
             </p:cNvPr>
@@ -11290,7 +12986,7 @@
     </p:spTree>
     <p:extLst>
       <p:ext uri="{BB962C8B-B14F-4D97-AF65-F5344CB8AC3E}">
-        <p14:creationId xmlns:p14="http://schemas.microsoft.com/office/powerpoint/2010/main" val="1080759391"/>
+        <p14:creationId xmlns:p14="http://schemas.microsoft.com/office/powerpoint/2010/main" val="1356863602"/>
       </p:ext>
     </p:extLst>
   </p:cSld>
@@ -11300,7 +12996,7 @@
 </p:sld>
 </file>
 
-<file path=ppt/slides/slide4.xml><?xml version="1.0" encoding="utf-8"?>
+<file path=ppt/slides/slide5.xml><?xml version="1.0" encoding="utf-8"?>
 <p:sld xmlns:a="http://schemas.openxmlformats.org/drawingml/2006/main" xmlns:r="http://schemas.openxmlformats.org/officeDocument/2006/relationships" xmlns:p="http://schemas.openxmlformats.org/presentationml/2006/main">
   <p:cSld>
     <p:spTree>
@@ -11421,14 +13117,14 @@
           <p:nvPr>
             <p:extLst>
               <p:ext uri="{D42A27DB-BD31-4B8C-83A1-F6EECF244321}">
-                <p14:modId xmlns:p14="http://schemas.microsoft.com/office/powerpoint/2010/main" val="3922028865"/>
+                <p14:modId xmlns:p14="http://schemas.microsoft.com/office/powerpoint/2010/main" val="2001430139"/>
               </p:ext>
             </p:extLst>
           </p:nvPr>
         </p:nvGraphicFramePr>
         <p:xfrm>
           <a:off x="7150654" y="2479427"/>
-          <a:ext cx="4852660" cy="2595880"/>
+          <a:ext cx="4852660" cy="2966720"/>
         </p:xfrm>
         <a:graphic>
           <a:graphicData uri="http://schemas.openxmlformats.org/drawingml/2006/table">
@@ -11626,7 +13322,7 @@
                     <a:p>
                       <a:r>
                         <a:rPr lang="en-US" sz="1400" dirty="0"/>
-                        <a:t>Contact</a:t>
+                        <a:t>Connection</a:t>
                       </a:r>
                     </a:p>
                   </a:txBody>
@@ -11664,7 +13360,7 @@
                 </a:tc>
                 <a:extLst>
                   <a:ext uri="{0D108BD9-81ED-4DB2-BD59-A6C34878D82A}">
-                    <a16:rowId xmlns:a16="http://schemas.microsoft.com/office/drawing/2014/main" val="1167480664"/>
+                    <a16:rowId xmlns:a16="http://schemas.microsoft.com/office/drawing/2014/main" val="3098768806"/>
                   </a:ext>
                 </a:extLst>
               </a:tr>
@@ -11676,7 +13372,7 @@
                     <a:p>
                       <a:r>
                         <a:rPr lang="en-US" sz="1400" dirty="0"/>
-                        <a:t>Task</a:t>
+                        <a:t>Contact</a:t>
                       </a:r>
                     </a:p>
                   </a:txBody>
@@ -11714,7 +13410,7 @@
                 </a:tc>
                 <a:extLst>
                   <a:ext uri="{0D108BD9-81ED-4DB2-BD59-A6C34878D82A}">
-                    <a16:rowId xmlns:a16="http://schemas.microsoft.com/office/drawing/2014/main" val="3656533824"/>
+                    <a16:rowId xmlns:a16="http://schemas.microsoft.com/office/drawing/2014/main" val="1167480664"/>
                   </a:ext>
                 </a:extLst>
               </a:tr>
@@ -11726,7 +13422,7 @@
                     <a:p>
                       <a:r>
                         <a:rPr lang="en-US" sz="1400" dirty="0"/>
-                        <a:t>User</a:t>
+                        <a:t>Task</a:t>
                       </a:r>
                     </a:p>
                   </a:txBody>
@@ -11764,6 +13460,56 @@
                 </a:tc>
                 <a:extLst>
                   <a:ext uri="{0D108BD9-81ED-4DB2-BD59-A6C34878D82A}">
+                    <a16:rowId xmlns:a16="http://schemas.microsoft.com/office/drawing/2014/main" val="3656533824"/>
+                  </a:ext>
+                </a:extLst>
+              </a:tr>
+              <a:tr h="370840">
+                <a:tc>
+                  <a:txBody>
+                    <a:bodyPr/>
+                    <a:lstStyle/>
+                    <a:p>
+                      <a:r>
+                        <a:rPr lang="en-US" sz="1400" dirty="0"/>
+                        <a:t>User</a:t>
+                      </a:r>
+                    </a:p>
+                  </a:txBody>
+                  <a:tcPr/>
+                </a:tc>
+                <a:tc>
+                  <a:txBody>
+                    <a:bodyPr/>
+                    <a:lstStyle/>
+                    <a:p>
+                      <a:pPr marL="0" marR="0" lvl="0" indent="0" algn="l" defTabSz="914400" rtl="0" eaLnBrk="1" fontAlgn="auto" latinLnBrk="0" hangingPunct="1">
+                        <a:lnSpc>
+                          <a:spcPct val="100000"/>
+                        </a:lnSpc>
+                        <a:spcBef>
+                          <a:spcPts val="0"/>
+                        </a:spcBef>
+                        <a:spcAft>
+                          <a:spcPts val="0"/>
+                        </a:spcAft>
+                        <a:buClrTx/>
+                        <a:buSzTx/>
+                        <a:buFontTx/>
+                        <a:buNone/>
+                        <a:tabLst/>
+                        <a:defRPr/>
+                      </a:pPr>
+                      <a:r>
+                        <a:rPr lang="en-US" sz="1400" dirty="0"/>
+                        <a:t>CDM Common</a:t>
+                      </a:r>
+                    </a:p>
+                  </a:txBody>
+                  <a:tcPr/>
+                </a:tc>
+                <a:extLst>
+                  <a:ext uri="{0D108BD9-81ED-4DB2-BD59-A6C34878D82A}">
                     <a16:rowId xmlns:a16="http://schemas.microsoft.com/office/drawing/2014/main" val="3998260982"/>
                   </a:ext>
                 </a:extLst>
@@ -11774,10 +13520,10 @@
       </p:graphicFrame>
       <p:grpSp>
         <p:nvGrpSpPr>
-          <p:cNvPr id="15" name="Group 14">
+          <p:cNvPr id="13" name="Group 12">
             <a:extLst>
               <a:ext uri="{FF2B5EF4-FFF2-40B4-BE49-F238E27FC236}">
-                <a16:creationId xmlns:a16="http://schemas.microsoft.com/office/drawing/2014/main" id="{232C7072-66E0-46EB-820F-9BFD6FB3AF37}"/>
+                <a16:creationId xmlns:a16="http://schemas.microsoft.com/office/drawing/2014/main" id="{59B7B53B-256C-225E-6A00-13D9B5190BD8}"/>
               </a:ext>
             </a:extLst>
           </p:cNvPr>
@@ -11786,7 +13532,7 @@
         </p:nvGrpSpPr>
         <p:grpSpPr>
           <a:xfrm>
-            <a:off x="865920" y="2230240"/>
+            <a:off x="865920" y="2197189"/>
             <a:ext cx="5031914" cy="2102360"/>
             <a:chOff x="865920" y="2230240"/>
             <a:chExt cx="5031914" cy="2102360"/>
@@ -11794,10 +13540,10 @@
         </p:grpSpPr>
         <p:sp>
           <p:nvSpPr>
-            <p:cNvPr id="16" name="Rectangle 15">
+            <p:cNvPr id="23" name="Rectangle 22">
               <a:extLst>
                 <a:ext uri="{FF2B5EF4-FFF2-40B4-BE49-F238E27FC236}">
-                  <a16:creationId xmlns:a16="http://schemas.microsoft.com/office/drawing/2014/main" id="{DB81AC09-AA3B-48E8-B7F4-FECAF1155FA2}"/>
+                  <a16:creationId xmlns:a16="http://schemas.microsoft.com/office/drawing/2014/main" id="{D57A1706-E2E0-5B80-0F04-AC6DEBB7CBCF}"/>
                 </a:ext>
               </a:extLst>
             </p:cNvPr>
@@ -11852,10 +13598,10 @@
         </p:sp>
         <p:sp>
           <p:nvSpPr>
-            <p:cNvPr id="17" name="Rectangle 16">
+            <p:cNvPr id="24" name="Rectangle 23">
               <a:extLst>
                 <a:ext uri="{FF2B5EF4-FFF2-40B4-BE49-F238E27FC236}">
-                  <a16:creationId xmlns:a16="http://schemas.microsoft.com/office/drawing/2014/main" id="{F0B83B28-9F79-4BA0-81F2-258A7296F79F}"/>
+                  <a16:creationId xmlns:a16="http://schemas.microsoft.com/office/drawing/2014/main" id="{AD653E30-8BA5-7E5A-7BDC-14F7EA1D64FF}"/>
                 </a:ext>
               </a:extLst>
             </p:cNvPr>
@@ -11900,17 +13646,17 @@
                   <a:latin typeface="Segoe UI" panose="020B0502040204020203" pitchFamily="34" charset="0"/>
                   <a:cs typeface="Segoe UI" panose="020B0502040204020203" pitchFamily="34" charset="0"/>
                 </a:rPr>
-                <a:t>Education Accelerator Common Common</a:t>
+                <a:t>Education Accelerator Common</a:t>
               </a:r>
             </a:p>
           </p:txBody>
         </p:sp>
         <p:sp>
           <p:nvSpPr>
-            <p:cNvPr id="18" name="Rectangle 17">
+            <p:cNvPr id="25" name="Rectangle 24">
               <a:extLst>
                 <a:ext uri="{FF2B5EF4-FFF2-40B4-BE49-F238E27FC236}">
-                  <a16:creationId xmlns:a16="http://schemas.microsoft.com/office/drawing/2014/main" id="{C3C5A57F-D1EE-471C-999B-EF187C4B65A9}"/>
+                  <a16:creationId xmlns:a16="http://schemas.microsoft.com/office/drawing/2014/main" id="{38290D88-75F6-F163-7EFB-0AAF6435F798}"/>
                 </a:ext>
               </a:extLst>
             </p:cNvPr>
@@ -11958,17 +13704,17 @@
                   <a:latin typeface="Segoe UI" panose="020B0502040204020203" pitchFamily="34" charset="0"/>
                   <a:cs typeface="Segoe UI" panose="020B0502040204020203" pitchFamily="34" charset="0"/>
                 </a:rPr>
-                <a:t>Dynamics 365 Higher Education Accelerator Common Canvas Model Apps</a:t>
+                <a:t>Dynamics 365 Higher Education Accelerator Canvas Model Apps</a:t>
               </a:r>
             </a:p>
           </p:txBody>
         </p:sp>
         <p:sp>
           <p:nvSpPr>
-            <p:cNvPr id="19" name="Rectangle 18">
+            <p:cNvPr id="26" name="Rectangle 25">
               <a:extLst>
                 <a:ext uri="{FF2B5EF4-FFF2-40B4-BE49-F238E27FC236}">
-                  <a16:creationId xmlns:a16="http://schemas.microsoft.com/office/drawing/2014/main" id="{2761E057-B4F2-47EA-8660-8755E113FC0E}"/>
+                  <a16:creationId xmlns:a16="http://schemas.microsoft.com/office/drawing/2014/main" id="{B775A522-0D04-8C77-79A3-F13C92C31FC8}"/>
                 </a:ext>
               </a:extLst>
             </p:cNvPr>
@@ -12016,17 +13762,17 @@
                   <a:latin typeface="Segoe UI" panose="020B0502040204020203" pitchFamily="34" charset="0"/>
                   <a:cs typeface="Segoe UI" panose="020B0502040204020203" pitchFamily="34" charset="0"/>
                 </a:rPr>
-                <a:t>Dynamics 365 Higher Education Accelerator Common</a:t>
+                <a:t>Dynamics 365 Higher Education Accelerator</a:t>
               </a:r>
             </a:p>
           </p:txBody>
         </p:sp>
         <p:sp>
           <p:nvSpPr>
-            <p:cNvPr id="20" name="Rectangle 19">
+            <p:cNvPr id="27" name="Rectangle 26">
               <a:extLst>
                 <a:ext uri="{FF2B5EF4-FFF2-40B4-BE49-F238E27FC236}">
-                  <a16:creationId xmlns:a16="http://schemas.microsoft.com/office/drawing/2014/main" id="{DA6D3117-EC92-4017-A100-355CA5564466}"/>
+                  <a16:creationId xmlns:a16="http://schemas.microsoft.com/office/drawing/2014/main" id="{FBBBC045-8FD2-5D67-0E72-244ED72CCB0D}"/>
                 </a:ext>
               </a:extLst>
             </p:cNvPr>
@@ -12101,10 +13847,10 @@
         </p:sp>
         <p:sp>
           <p:nvSpPr>
-            <p:cNvPr id="21" name="Rectangle 20">
+            <p:cNvPr id="28" name="Rectangle 27">
               <a:extLst>
                 <a:ext uri="{FF2B5EF4-FFF2-40B4-BE49-F238E27FC236}">
-                  <a16:creationId xmlns:a16="http://schemas.microsoft.com/office/drawing/2014/main" id="{D529FB54-5D28-47A1-8AEE-C32F3BDFF5A7}"/>
+                  <a16:creationId xmlns:a16="http://schemas.microsoft.com/office/drawing/2014/main" id="{2C2693B2-30C9-3F6F-6BE4-BDAE96D4482D}"/>
                 </a:ext>
               </a:extLst>
             </p:cNvPr>
@@ -12159,10 +13905,10 @@
         </p:sp>
         <p:sp>
           <p:nvSpPr>
-            <p:cNvPr id="22" name="Rectangle 21">
+            <p:cNvPr id="29" name="Rectangle 28">
               <a:extLst>
                 <a:ext uri="{FF2B5EF4-FFF2-40B4-BE49-F238E27FC236}">
-                  <a16:creationId xmlns:a16="http://schemas.microsoft.com/office/drawing/2014/main" id="{20C25B75-781A-47DE-8DC3-4156E71F3ECC}"/>
+                  <a16:creationId xmlns:a16="http://schemas.microsoft.com/office/drawing/2014/main" id="{B88D9A39-FC53-3D86-ABB5-33CD2C13E8CD}"/>
                 </a:ext>
               </a:extLst>
             </p:cNvPr>
@@ -12229,7 +13975,7 @@
 </p:sld>
 </file>
 
-<file path=ppt/slides/slide5.xml><?xml version="1.0" encoding="utf-8"?>
+<file path=ppt/slides/slide6.xml><?xml version="1.0" encoding="utf-8"?>
 <p:sld xmlns:a="http://schemas.openxmlformats.org/drawingml/2006/main" xmlns:r="http://schemas.openxmlformats.org/officeDocument/2006/relationships" xmlns:p="http://schemas.openxmlformats.org/presentationml/2006/main">
   <p:cSld>
     <p:spTree>
@@ -12859,7 +14605,7 @@
                   <a:latin typeface="Segoe UI" panose="020B0502040204020203" pitchFamily="34" charset="0"/>
                   <a:cs typeface="Segoe UI" panose="020B0502040204020203" pitchFamily="34" charset="0"/>
                 </a:rPr>
-                <a:t>Education Accelerator Common Common</a:t>
+                <a:t>Education Accelerator Common</a:t>
               </a:r>
             </a:p>
           </p:txBody>
@@ -12917,7 +14663,7 @@
                   <a:latin typeface="Segoe UI" panose="020B0502040204020203" pitchFamily="34" charset="0"/>
                   <a:cs typeface="Segoe UI" panose="020B0502040204020203" pitchFamily="34" charset="0"/>
                 </a:rPr>
-                <a:t>Dynamics 365 Higher Education Accelerator Common Canvas Model Apps</a:t>
+                <a:t>Dynamics 365 Higher Education Accelerator Canvas Model Apps</a:t>
               </a:r>
             </a:p>
           </p:txBody>
@@ -12975,7 +14721,7 @@
                   <a:latin typeface="Segoe UI" panose="020B0502040204020203" pitchFamily="34" charset="0"/>
                   <a:cs typeface="Segoe UI" panose="020B0502040204020203" pitchFamily="34" charset="0"/>
                 </a:rPr>
-                <a:t>Dynamics 365 Higher Education Accelerator Common</a:t>
+                <a:t>Dynamics 365 Higher Education Accelerator</a:t>
               </a:r>
             </a:p>
           </p:txBody>
@@ -13185,7 +14931,7 @@
 </p:sld>
 </file>
 
-<file path=ppt/slides/slide6.xml><?xml version="1.0" encoding="utf-8"?>
+<file path=ppt/slides/slide7.xml><?xml version="1.0" encoding="utf-8"?>
 <p:sld xmlns:a="http://schemas.openxmlformats.org/drawingml/2006/main" xmlns:r="http://schemas.openxmlformats.org/officeDocument/2006/relationships" xmlns:p="http://schemas.openxmlformats.org/presentationml/2006/main">
   <p:cSld>
     <p:spTree>
@@ -13815,7 +15561,7 @@
                   <a:latin typeface="Segoe UI" panose="020B0502040204020203" pitchFamily="34" charset="0"/>
                   <a:cs typeface="Segoe UI" panose="020B0502040204020203" pitchFamily="34" charset="0"/>
                 </a:rPr>
-                <a:t>Education Accelerator Common Common</a:t>
+                <a:t>Education Accelerator Common</a:t>
               </a:r>
             </a:p>
           </p:txBody>
@@ -13873,7 +15619,7 @@
                   <a:latin typeface="Segoe UI" panose="020B0502040204020203" pitchFamily="34" charset="0"/>
                   <a:cs typeface="Segoe UI" panose="020B0502040204020203" pitchFamily="34" charset="0"/>
                 </a:rPr>
-                <a:t>Dynamics 365 Higher Education Accelerator Common Canvas Model Apps</a:t>
+                <a:t>Dynamics 365 Higher Education Accelerator Canvas Model Apps</a:t>
               </a:r>
             </a:p>
           </p:txBody>
@@ -13931,7 +15677,7 @@
                   <a:latin typeface="Segoe UI" panose="020B0502040204020203" pitchFamily="34" charset="0"/>
                   <a:cs typeface="Segoe UI" panose="020B0502040204020203" pitchFamily="34" charset="0"/>
                 </a:rPr>
-                <a:t>Dynamics 365 Higher Education Accelerator Common</a:t>
+                <a:t>Dynamics 365 Higher Education Accelerator</a:t>
               </a:r>
             </a:p>
           </p:txBody>
@@ -14141,7 +15887,7 @@
 </p:sld>
 </file>
 
-<file path=ppt/slides/slide7.xml><?xml version="1.0" encoding="utf-8"?>
+<file path=ppt/slides/slide8.xml><?xml version="1.0" encoding="utf-8"?>
 <p:sld xmlns:a="http://schemas.openxmlformats.org/drawingml/2006/main" xmlns:r="http://schemas.openxmlformats.org/officeDocument/2006/relationships" xmlns:p="http://schemas.openxmlformats.org/presentationml/2006/main">
   <p:cSld>
     <p:spTree>
@@ -14575,7 +16321,7 @@
                   <a:latin typeface="Segoe UI" panose="020B0502040204020203" pitchFamily="34" charset="0"/>
                   <a:cs typeface="Segoe UI" panose="020B0502040204020203" pitchFamily="34" charset="0"/>
                 </a:rPr>
-                <a:t>Education Accelerator Common Common</a:t>
+                <a:t>Education Accelerator Common</a:t>
               </a:r>
             </a:p>
           </p:txBody>
@@ -14633,7 +16379,7 @@
                   <a:latin typeface="Segoe UI" panose="020B0502040204020203" pitchFamily="34" charset="0"/>
                   <a:cs typeface="Segoe UI" panose="020B0502040204020203" pitchFamily="34" charset="0"/>
                 </a:rPr>
-                <a:t>Dynamics 365 Higher Education Accelerator Common Canvas Model Apps</a:t>
+                <a:t>Dynamics 365 Higher Education Accelerator Canvas Model Apps</a:t>
               </a:r>
             </a:p>
           </p:txBody>
@@ -14691,7 +16437,7 @@
                   <a:latin typeface="Segoe UI" panose="020B0502040204020203" pitchFamily="34" charset="0"/>
                   <a:cs typeface="Segoe UI" panose="020B0502040204020203" pitchFamily="34" charset="0"/>
                 </a:rPr>
-                <a:t>Dynamics 365 Higher Education Accelerator Common</a:t>
+                <a:t>Dynamics 365 Higher Education Accelerator</a:t>
               </a:r>
             </a:p>
           </p:txBody>
@@ -14901,7 +16647,7 @@
 </p:sld>
 </file>
 
-<file path=ppt/slides/slide8.xml><?xml version="1.0" encoding="utf-8"?>
+<file path=ppt/slides/slide9.xml><?xml version="1.0" encoding="utf-8"?>
 <p:sld xmlns:a="http://schemas.openxmlformats.org/drawingml/2006/main" xmlns:r="http://schemas.openxmlformats.org/officeDocument/2006/relationships" xmlns:p="http://schemas.openxmlformats.org/presentationml/2006/main">
   <p:cSld>
     <p:spTree>
@@ -14951,7 +16697,7 @@
                 <a:latin typeface="Segoe UI" panose="020B0502040204020203" pitchFamily="34" charset="0"/>
                 <a:cs typeface="Segoe UI" panose="020B0502040204020203" pitchFamily="34" charset="0"/>
               </a:rPr>
-              <a:t>Dynamics 365 Higher Education Accelerator Common -&gt; Primary Entities</a:t>
+              <a:t>Dynamics 365 Higher Education Accelerator -&gt; Primary Entities</a:t>
             </a:r>
           </a:p>
         </p:txBody>
@@ -15241,7 +16987,7 @@
                   <a:latin typeface="Segoe UI" panose="020B0502040204020203" pitchFamily="34" charset="0"/>
                   <a:cs typeface="Segoe UI" panose="020B0502040204020203" pitchFamily="34" charset="0"/>
                 </a:rPr>
-                <a:t>Education Accelerator Common Common</a:t>
+                <a:t>Education Accelerator Common</a:t>
               </a:r>
             </a:p>
           </p:txBody>
@@ -15299,7 +17045,7 @@
                   <a:latin typeface="Segoe UI" panose="020B0502040204020203" pitchFamily="34" charset="0"/>
                   <a:cs typeface="Segoe UI" panose="020B0502040204020203" pitchFamily="34" charset="0"/>
                 </a:rPr>
-                <a:t>Dynamics 365 Higher Education Accelerator Common Canvas Model Apps</a:t>
+                <a:t>Dynamics 365 Higher Education Accelerator Canvas Model Apps</a:t>
               </a:r>
             </a:p>
           </p:txBody>
@@ -15354,7 +17100,7 @@
                   <a:latin typeface="Segoe UI" panose="020B0502040204020203" pitchFamily="34" charset="0"/>
                   <a:cs typeface="Segoe UI" panose="020B0502040204020203" pitchFamily="34" charset="0"/>
                 </a:rPr>
-                <a:t>Dynamics 365 Higher Education Accelerator Common</a:t>
+                <a:t>Dynamics 365 Higher Education Accelerator</a:t>
               </a:r>
             </a:p>
           </p:txBody>
@@ -15558,751 +17304,6 @@
     <p:extLst>
       <p:ext uri="{BB962C8B-B14F-4D97-AF65-F5344CB8AC3E}">
         <p14:creationId xmlns:p14="http://schemas.microsoft.com/office/powerpoint/2010/main" val="234365872"/>
-      </p:ext>
-    </p:extLst>
-  </p:cSld>
-  <p:clrMapOvr>
-    <a:masterClrMapping/>
-  </p:clrMapOvr>
-</p:sld>
-</file>
-
-<file path=ppt/slides/slide9.xml><?xml version="1.0" encoding="utf-8"?>
-<p:sld xmlns:a="http://schemas.openxmlformats.org/drawingml/2006/main" xmlns:r="http://schemas.openxmlformats.org/officeDocument/2006/relationships" xmlns:p="http://schemas.openxmlformats.org/presentationml/2006/main">
-  <p:cSld>
-    <p:spTree>
-      <p:nvGrpSpPr>
-        <p:cNvPr id="1" name=""/>
-        <p:cNvGrpSpPr/>
-        <p:nvPr/>
-      </p:nvGrpSpPr>
-      <p:grpSpPr>
-        <a:xfrm>
-          <a:off x="0" y="0"/>
-          <a:ext cx="0" cy="0"/>
-          <a:chOff x="0" y="0"/>
-          <a:chExt cx="0" cy="0"/>
-        </a:xfrm>
-      </p:grpSpPr>
-      <p:sp>
-        <p:nvSpPr>
-          <p:cNvPr id="4" name="TextBox 3">
-            <a:extLst>
-              <a:ext uri="{FF2B5EF4-FFF2-40B4-BE49-F238E27FC236}">
-                <a16:creationId xmlns:a16="http://schemas.microsoft.com/office/drawing/2014/main" id="{C07C45B8-4983-4FFB-BD8B-B2F43686E476}"/>
-              </a:ext>
-            </a:extLst>
-          </p:cNvPr>
-          <p:cNvSpPr txBox="1"/>
-          <p:nvPr/>
-        </p:nvSpPr>
-        <p:spPr>
-          <a:xfrm flipH="1">
-            <a:off x="348339" y="457163"/>
-            <a:ext cx="11760533" cy="523220"/>
-          </a:xfrm>
-          <a:prstGeom prst="rect">
-            <a:avLst/>
-          </a:prstGeom>
-          <a:noFill/>
-        </p:spPr>
-        <p:txBody>
-          <a:bodyPr wrap="square" rtlCol="0">
-            <a:spAutoFit/>
-          </a:bodyPr>
-          <a:lstStyle/>
-          <a:p>
-            <a:r>
-              <a:rPr lang="en-US" sz="2800" dirty="0">
-                <a:latin typeface="Segoe UI" panose="020B0502040204020203" pitchFamily="34" charset="0"/>
-                <a:cs typeface="Segoe UI" panose="020B0502040204020203" pitchFamily="34" charset="0"/>
-              </a:rPr>
-              <a:t>Dynamics 365 Higher Education Accelerator Common -&gt; Enriched Entities</a:t>
-            </a:r>
-          </a:p>
-        </p:txBody>
-      </p:sp>
-      <p:graphicFrame>
-        <p:nvGraphicFramePr>
-          <p:cNvPr id="14" name="Table 35">
-            <a:extLst>
-              <a:ext uri="{FF2B5EF4-FFF2-40B4-BE49-F238E27FC236}">
-                <a16:creationId xmlns:a16="http://schemas.microsoft.com/office/drawing/2014/main" id="{42BC281D-59CA-447C-9B7C-C15927A39405}"/>
-              </a:ext>
-            </a:extLst>
-          </p:cNvPr>
-          <p:cNvGraphicFramePr>
-            <a:graphicFrameLocks noGrp="1"/>
-          </p:cNvGraphicFramePr>
-          <p:nvPr>
-            <p:extLst>
-              <p:ext uri="{D42A27DB-BD31-4B8C-83A1-F6EECF244321}">
-                <p14:modId xmlns:p14="http://schemas.microsoft.com/office/powerpoint/2010/main" val="3349973338"/>
-              </p:ext>
-            </p:extLst>
-          </p:nvPr>
-        </p:nvGraphicFramePr>
-        <p:xfrm>
-          <a:off x="7150654" y="2617970"/>
-          <a:ext cx="4852660" cy="1630680"/>
-        </p:xfrm>
-        <a:graphic>
-          <a:graphicData uri="http://schemas.openxmlformats.org/drawingml/2006/table">
-            <a:tbl>
-              <a:tblPr firstRow="1" bandRow="1">
-                <a:tableStyleId>{B301B821-A1FF-4177-AEE7-76D212191A09}</a:tableStyleId>
-              </a:tblPr>
-              <a:tblGrid>
-                <a:gridCol w="2254603">
-                  <a:extLst>
-                    <a:ext uri="{9D8B030D-6E8A-4147-A177-3AD203B41FA5}">
-                      <a16:colId xmlns:a16="http://schemas.microsoft.com/office/drawing/2014/main" val="832068167"/>
-                    </a:ext>
-                  </a:extLst>
-                </a:gridCol>
-                <a:gridCol w="2598057">
-                  <a:extLst>
-                    <a:ext uri="{9D8B030D-6E8A-4147-A177-3AD203B41FA5}">
-                      <a16:colId xmlns:a16="http://schemas.microsoft.com/office/drawing/2014/main" val="2702330717"/>
-                    </a:ext>
-                  </a:extLst>
-                </a:gridCol>
-              </a:tblGrid>
-              <a:tr h="370840">
-                <a:tc>
-                  <a:txBody>
-                    <a:bodyPr/>
-                    <a:lstStyle/>
-                    <a:p>
-                      <a:r>
-                        <a:rPr lang="en-US" sz="1400" dirty="0"/>
-                        <a:t>Entity Name</a:t>
-                      </a:r>
-                    </a:p>
-                  </a:txBody>
-                  <a:tcPr/>
-                </a:tc>
-                <a:tc>
-                  <a:txBody>
-                    <a:bodyPr/>
-                    <a:lstStyle/>
-                    <a:p>
-                      <a:r>
-                        <a:rPr lang="en-US" sz="1400" dirty="0"/>
-                        <a:t>Source</a:t>
-                      </a:r>
-                    </a:p>
-                  </a:txBody>
-                  <a:tcPr/>
-                </a:tc>
-                <a:extLst>
-                  <a:ext uri="{0D108BD9-81ED-4DB2-BD59-A6C34878D82A}">
-                    <a16:rowId xmlns:a16="http://schemas.microsoft.com/office/drawing/2014/main" val="897896226"/>
-                  </a:ext>
-                </a:extLst>
-              </a:tr>
-              <a:tr h="370840">
-                <a:tc>
-                  <a:txBody>
-                    <a:bodyPr/>
-                    <a:lstStyle/>
-                    <a:p>
-                      <a:r>
-                        <a:rPr lang="en-US" sz="1400" dirty="0"/>
-                        <a:t>Account</a:t>
-                      </a:r>
-                    </a:p>
-                  </a:txBody>
-                  <a:tcPr/>
-                </a:tc>
-                <a:tc>
-                  <a:txBody>
-                    <a:bodyPr/>
-                    <a:lstStyle/>
-                    <a:p>
-                      <a:r>
-                        <a:rPr lang="en-US" sz="1400" dirty="0"/>
-                        <a:t>Common CDM</a:t>
-                      </a:r>
-                    </a:p>
-                  </a:txBody>
-                  <a:tcPr/>
-                </a:tc>
-                <a:extLst>
-                  <a:ext uri="{0D108BD9-81ED-4DB2-BD59-A6C34878D82A}">
-                    <a16:rowId xmlns:a16="http://schemas.microsoft.com/office/drawing/2014/main" val="2241325783"/>
-                  </a:ext>
-                </a:extLst>
-              </a:tr>
-              <a:tr h="370840">
-                <a:tc>
-                  <a:txBody>
-                    <a:bodyPr/>
-                    <a:lstStyle/>
-                    <a:p>
-                      <a:r>
-                        <a:rPr lang="en-US" sz="1400" dirty="0"/>
-                        <a:t>Contact</a:t>
-                      </a:r>
-                    </a:p>
-                  </a:txBody>
-                  <a:tcPr/>
-                </a:tc>
-                <a:tc>
-                  <a:txBody>
-                    <a:bodyPr/>
-                    <a:lstStyle/>
-                    <a:p>
-                      <a:r>
-                        <a:rPr lang="en-US" sz="1400" dirty="0"/>
-                        <a:t>Common CDM</a:t>
-                      </a:r>
-                    </a:p>
-                  </a:txBody>
-                  <a:tcPr/>
-                </a:tc>
-                <a:extLst>
-                  <a:ext uri="{0D108BD9-81ED-4DB2-BD59-A6C34878D82A}">
-                    <a16:rowId xmlns:a16="http://schemas.microsoft.com/office/drawing/2014/main" val="2508927978"/>
-                  </a:ext>
-                </a:extLst>
-              </a:tr>
-              <a:tr h="370840">
-                <a:tc>
-                  <a:txBody>
-                    <a:bodyPr/>
-                    <a:lstStyle/>
-                    <a:p>
-                      <a:r>
-                        <a:rPr lang="en-US" sz="1400" dirty="0"/>
-                        <a:t>Recommended Student Resource</a:t>
-                      </a:r>
-                    </a:p>
-                  </a:txBody>
-                  <a:tcPr/>
-                </a:tc>
-                <a:tc>
-                  <a:txBody>
-                    <a:bodyPr/>
-                    <a:lstStyle/>
-                    <a:p>
-                      <a:r>
-                        <a:rPr lang="en-US" sz="1400" dirty="0"/>
-                        <a:t>Education Accelerator Common</a:t>
-                      </a:r>
-                    </a:p>
-                  </a:txBody>
-                  <a:tcPr/>
-                </a:tc>
-                <a:extLst>
-                  <a:ext uri="{0D108BD9-81ED-4DB2-BD59-A6C34878D82A}">
-                    <a16:rowId xmlns:a16="http://schemas.microsoft.com/office/drawing/2014/main" val="3838149768"/>
-                  </a:ext>
-                </a:extLst>
-              </a:tr>
-            </a:tbl>
-          </a:graphicData>
-        </a:graphic>
-      </p:graphicFrame>
-      <p:sp>
-        <p:nvSpPr>
-          <p:cNvPr id="15" name="Arrow: Right 14">
-            <a:extLst>
-              <a:ext uri="{FF2B5EF4-FFF2-40B4-BE49-F238E27FC236}">
-                <a16:creationId xmlns:a16="http://schemas.microsoft.com/office/drawing/2014/main" id="{AAB858B2-CD60-4C31-9BDB-CD6561A5C3FE}"/>
-              </a:ext>
-            </a:extLst>
-          </p:cNvPr>
-          <p:cNvSpPr/>
-          <p:nvPr/>
-        </p:nvSpPr>
-        <p:spPr>
-          <a:xfrm>
-            <a:off x="6035040" y="3198859"/>
-            <a:ext cx="978408" cy="484632"/>
-          </a:xfrm>
-          <a:prstGeom prst="rightArrow">
-            <a:avLst/>
-          </a:prstGeom>
-          <a:ln w="28575">
-            <a:solidFill>
-              <a:srgbClr val="FFC000"/>
-            </a:solidFill>
-          </a:ln>
-        </p:spPr>
-        <p:style>
-          <a:lnRef idx="2">
-            <a:schemeClr val="accent1">
-              <a:shade val="50000"/>
-            </a:schemeClr>
-          </a:lnRef>
-          <a:fillRef idx="1">
-            <a:schemeClr val="accent1"/>
-          </a:fillRef>
-          <a:effectRef idx="0">
-            <a:schemeClr val="accent1"/>
-          </a:effectRef>
-          <a:fontRef idx="minor">
-            <a:schemeClr val="lt1"/>
-          </a:fontRef>
-        </p:style>
-        <p:txBody>
-          <a:bodyPr rtlCol="0" anchor="ctr"/>
-          <a:lstStyle/>
-          <a:p>
-            <a:pPr algn="ctr"/>
-            <a:endParaRPr lang="en-US"/>
-          </a:p>
-        </p:txBody>
-      </p:sp>
-      <p:grpSp>
-        <p:nvGrpSpPr>
-          <p:cNvPr id="12" name="Group 11">
-            <a:extLst>
-              <a:ext uri="{FF2B5EF4-FFF2-40B4-BE49-F238E27FC236}">
-                <a16:creationId xmlns:a16="http://schemas.microsoft.com/office/drawing/2014/main" id="{E152B160-02BA-403D-BB79-DF576E2F2783}"/>
-              </a:ext>
-            </a:extLst>
-          </p:cNvPr>
-          <p:cNvGrpSpPr/>
-          <p:nvPr/>
-        </p:nvGrpSpPr>
-        <p:grpSpPr>
-          <a:xfrm>
-            <a:off x="865920" y="2558714"/>
-            <a:ext cx="5031914" cy="2102360"/>
-            <a:chOff x="865920" y="2230240"/>
-            <a:chExt cx="5031914" cy="2102360"/>
-          </a:xfrm>
-        </p:grpSpPr>
-        <p:sp>
-          <p:nvSpPr>
-            <p:cNvPr id="13" name="Rectangle 12">
-              <a:extLst>
-                <a:ext uri="{FF2B5EF4-FFF2-40B4-BE49-F238E27FC236}">
-                  <a16:creationId xmlns:a16="http://schemas.microsoft.com/office/drawing/2014/main" id="{21A2AF15-E594-40C8-9A28-537E44175916}"/>
-                </a:ext>
-              </a:extLst>
-            </p:cNvPr>
-            <p:cNvSpPr/>
-            <p:nvPr/>
-          </p:nvSpPr>
-          <p:spPr>
-            <a:xfrm>
-              <a:off x="865924" y="4038736"/>
-              <a:ext cx="5031910" cy="293864"/>
-            </a:xfrm>
-            <a:prstGeom prst="rect">
-              <a:avLst/>
-            </a:prstGeom>
-            <a:solidFill>
-              <a:srgbClr val="FFEFBD"/>
-            </a:solidFill>
-          </p:spPr>
-          <p:style>
-            <a:lnRef idx="2">
-              <a:schemeClr val="accent4">
-                <a:shade val="50000"/>
-              </a:schemeClr>
-            </a:lnRef>
-            <a:fillRef idx="1">
-              <a:schemeClr val="accent4"/>
-            </a:fillRef>
-            <a:effectRef idx="0">
-              <a:schemeClr val="accent4"/>
-            </a:effectRef>
-            <a:fontRef idx="minor">
-              <a:schemeClr val="lt1"/>
-            </a:fontRef>
-          </p:style>
-          <p:txBody>
-            <a:bodyPr rtlCol="0" anchor="ctr"/>
-            <a:lstStyle/>
-            <a:p>
-              <a:pPr algn="ctr"/>
-              <a:r>
-                <a:rPr lang="en-US" sz="800" dirty="0">
-                  <a:solidFill>
-                    <a:schemeClr val="tx1"/>
-                  </a:solidFill>
-                  <a:latin typeface="Segoe UI" panose="020B0502040204020203" pitchFamily="34" charset="0"/>
-                  <a:cs typeface="Segoe UI" panose="020B0502040204020203" pitchFamily="34" charset="0"/>
-                </a:rPr>
-                <a:t>CDM Common</a:t>
-              </a:r>
-            </a:p>
-          </p:txBody>
-        </p:sp>
-        <p:sp>
-          <p:nvSpPr>
-            <p:cNvPr id="23" name="Rectangle 22">
-              <a:extLst>
-                <a:ext uri="{FF2B5EF4-FFF2-40B4-BE49-F238E27FC236}">
-                  <a16:creationId xmlns:a16="http://schemas.microsoft.com/office/drawing/2014/main" id="{1D8BEC6A-9048-4997-BBA2-04EAF5EF37C0}"/>
-                </a:ext>
-              </a:extLst>
-            </p:cNvPr>
-            <p:cNvSpPr/>
-            <p:nvPr/>
-          </p:nvSpPr>
-          <p:spPr>
-            <a:xfrm>
-              <a:off x="865921" y="3677036"/>
-              <a:ext cx="5031913" cy="293864"/>
-            </a:xfrm>
-            <a:prstGeom prst="rect">
-              <a:avLst/>
-            </a:prstGeom>
-            <a:solidFill>
-              <a:srgbClr val="CFDBF0"/>
-            </a:solidFill>
-          </p:spPr>
-          <p:style>
-            <a:lnRef idx="2">
-              <a:schemeClr val="accent1">
-                <a:shade val="50000"/>
-              </a:schemeClr>
-            </a:lnRef>
-            <a:fillRef idx="1">
-              <a:schemeClr val="accent1"/>
-            </a:fillRef>
-            <a:effectRef idx="0">
-              <a:schemeClr val="accent1"/>
-            </a:effectRef>
-            <a:fontRef idx="minor">
-              <a:schemeClr val="lt1"/>
-            </a:fontRef>
-          </p:style>
-          <p:txBody>
-            <a:bodyPr rtlCol="0" anchor="ctr"/>
-            <a:lstStyle/>
-            <a:p>
-              <a:pPr algn="ctr"/>
-              <a:r>
-                <a:rPr lang="en-US" sz="800" dirty="0">
-                  <a:solidFill>
-                    <a:schemeClr val="tx1"/>
-                  </a:solidFill>
-                  <a:latin typeface="Segoe UI" panose="020B0502040204020203" pitchFamily="34" charset="0"/>
-                  <a:cs typeface="Segoe UI" panose="020B0502040204020203" pitchFamily="34" charset="0"/>
-                </a:rPr>
-                <a:t>Education Accelerator Common Common</a:t>
-              </a:r>
-            </a:p>
-          </p:txBody>
-        </p:sp>
-        <p:sp>
-          <p:nvSpPr>
-            <p:cNvPr id="24" name="Rectangle 23">
-              <a:extLst>
-                <a:ext uri="{FF2B5EF4-FFF2-40B4-BE49-F238E27FC236}">
-                  <a16:creationId xmlns:a16="http://schemas.microsoft.com/office/drawing/2014/main" id="{A1652B8E-DA30-4222-9CAA-4648E414D287}"/>
-                </a:ext>
-              </a:extLst>
-            </p:cNvPr>
-            <p:cNvSpPr/>
-            <p:nvPr/>
-          </p:nvSpPr>
-          <p:spPr>
-            <a:xfrm>
-              <a:off x="3488769" y="2591098"/>
-              <a:ext cx="2409063" cy="293864"/>
-            </a:xfrm>
-            <a:prstGeom prst="rect">
-              <a:avLst/>
-            </a:prstGeom>
-            <a:solidFill>
-              <a:srgbClr val="CFDBF0"/>
-            </a:solidFill>
-          </p:spPr>
-          <p:style>
-            <a:lnRef idx="2">
-              <a:schemeClr val="accent1">
-                <a:shade val="50000"/>
-              </a:schemeClr>
-            </a:lnRef>
-            <a:fillRef idx="1">
-              <a:schemeClr val="accent1"/>
-            </a:fillRef>
-            <a:effectRef idx="0">
-              <a:schemeClr val="accent1"/>
-            </a:effectRef>
-            <a:fontRef idx="minor">
-              <a:schemeClr val="lt1"/>
-            </a:fontRef>
-          </p:style>
-          <p:txBody>
-            <a:bodyPr rtlCol="0" anchor="ctr"/>
-            <a:lstStyle/>
-            <a:p>
-              <a:pPr algn="ctr"/>
-              <a:r>
-                <a:rPr lang="en-US" sz="800" dirty="0">
-                  <a:solidFill>
-                    <a:schemeClr val="tx1"/>
-                  </a:solidFill>
-                  <a:latin typeface="Segoe UI" panose="020B0502040204020203" pitchFamily="34" charset="0"/>
-                  <a:cs typeface="Segoe UI" panose="020B0502040204020203" pitchFamily="34" charset="0"/>
-                </a:rPr>
-                <a:t>Dynamics 365 Higher Education Accelerator Common Canvas Model Apps</a:t>
-              </a:r>
-            </a:p>
-          </p:txBody>
-        </p:sp>
-        <p:sp>
-          <p:nvSpPr>
-            <p:cNvPr id="25" name="Rectangle 24">
-              <a:extLst>
-                <a:ext uri="{FF2B5EF4-FFF2-40B4-BE49-F238E27FC236}">
-                  <a16:creationId xmlns:a16="http://schemas.microsoft.com/office/drawing/2014/main" id="{6E1D1594-8CC8-45AB-901A-AA65AAB0DF84}"/>
-                </a:ext>
-              </a:extLst>
-            </p:cNvPr>
-            <p:cNvSpPr/>
-            <p:nvPr/>
-          </p:nvSpPr>
-          <p:spPr>
-            <a:xfrm>
-              <a:off x="865921" y="2953638"/>
-              <a:ext cx="5031911" cy="293864"/>
-            </a:xfrm>
-            <a:prstGeom prst="rect">
-              <a:avLst/>
-            </a:prstGeom>
-          </p:spPr>
-          <p:style>
-            <a:lnRef idx="2">
-              <a:schemeClr val="accent1">
-                <a:shade val="50000"/>
-              </a:schemeClr>
-            </a:lnRef>
-            <a:fillRef idx="1">
-              <a:schemeClr val="accent1"/>
-            </a:fillRef>
-            <a:effectRef idx="0">
-              <a:schemeClr val="accent1"/>
-            </a:effectRef>
-            <a:fontRef idx="minor">
-              <a:schemeClr val="lt1"/>
-            </a:fontRef>
-          </p:style>
-          <p:txBody>
-            <a:bodyPr rtlCol="0" anchor="ctr"/>
-            <a:lstStyle/>
-            <a:p>
-              <a:pPr algn="ctr"/>
-              <a:r>
-                <a:rPr lang="en-US" sz="800" dirty="0">
-                  <a:solidFill>
-                    <a:schemeClr val="bg1"/>
-                  </a:solidFill>
-                  <a:latin typeface="Segoe UI" panose="020B0502040204020203" pitchFamily="34" charset="0"/>
-                  <a:cs typeface="Segoe UI" panose="020B0502040204020203" pitchFamily="34" charset="0"/>
-                </a:rPr>
-                <a:t>Dynamics 365 Higher Education Accelerator Common</a:t>
-              </a:r>
-            </a:p>
-          </p:txBody>
-        </p:sp>
-        <p:sp>
-          <p:nvSpPr>
-            <p:cNvPr id="26" name="Rectangle 25">
-              <a:extLst>
-                <a:ext uri="{FF2B5EF4-FFF2-40B4-BE49-F238E27FC236}">
-                  <a16:creationId xmlns:a16="http://schemas.microsoft.com/office/drawing/2014/main" id="{1E8949F9-B926-4C8D-AA49-CD692D5760F1}"/>
-                </a:ext>
-              </a:extLst>
-            </p:cNvPr>
-            <p:cNvSpPr/>
-            <p:nvPr/>
-          </p:nvSpPr>
-          <p:spPr>
-            <a:xfrm>
-              <a:off x="865922" y="2230240"/>
-              <a:ext cx="2535568" cy="293864"/>
-            </a:xfrm>
-            <a:prstGeom prst="rect">
-              <a:avLst/>
-            </a:prstGeom>
-            <a:solidFill>
-              <a:srgbClr val="CFDBF0"/>
-            </a:solidFill>
-          </p:spPr>
-          <p:style>
-            <a:lnRef idx="2">
-              <a:schemeClr val="accent1">
-                <a:shade val="50000"/>
-              </a:schemeClr>
-            </a:lnRef>
-            <a:fillRef idx="1">
-              <a:schemeClr val="accent1"/>
-            </a:fillRef>
-            <a:effectRef idx="0">
-              <a:schemeClr val="accent1"/>
-            </a:effectRef>
-            <a:fontRef idx="minor">
-              <a:schemeClr val="lt1"/>
-            </a:fontRef>
-          </p:style>
-          <p:txBody>
-            <a:bodyPr rtlCol="0" anchor="ctr"/>
-            <a:lstStyle/>
-            <a:p>
-              <a:pPr algn="ctr"/>
-              <a:endParaRPr lang="en-US" sz="800" dirty="0">
-                <a:solidFill>
-                  <a:schemeClr val="tx1"/>
-                </a:solidFill>
-                <a:latin typeface="Segoe UI" panose="020B0502040204020203" pitchFamily="34" charset="0"/>
-                <a:cs typeface="Segoe UI" panose="020B0502040204020203" pitchFamily="34" charset="0"/>
-              </a:endParaRPr>
-            </a:p>
-            <a:p>
-              <a:pPr algn="ctr"/>
-              <a:r>
-                <a:rPr lang="en-US" sz="800" dirty="0">
-                  <a:solidFill>
-                    <a:schemeClr val="tx1"/>
-                  </a:solidFill>
-                  <a:latin typeface="Segoe UI" panose="020B0502040204020203" pitchFamily="34" charset="0"/>
-                  <a:cs typeface="Segoe UI" panose="020B0502040204020203" pitchFamily="34" charset="0"/>
-                </a:rPr>
-                <a:t>Dynamics 365 Higher Ed Portal</a:t>
-              </a:r>
-            </a:p>
-            <a:p>
-              <a:pPr algn="ctr"/>
-              <a:endParaRPr lang="en-US" sz="800" dirty="0">
-                <a:solidFill>
-                  <a:schemeClr val="tx1"/>
-                </a:solidFill>
-                <a:latin typeface="Segoe UI" panose="020B0502040204020203" pitchFamily="34" charset="0"/>
-                <a:cs typeface="Segoe UI" panose="020B0502040204020203" pitchFamily="34" charset="0"/>
-              </a:endParaRPr>
-            </a:p>
-          </p:txBody>
-        </p:sp>
-        <p:sp>
-          <p:nvSpPr>
-            <p:cNvPr id="27" name="Rectangle 26">
-              <a:extLst>
-                <a:ext uri="{FF2B5EF4-FFF2-40B4-BE49-F238E27FC236}">
-                  <a16:creationId xmlns:a16="http://schemas.microsoft.com/office/drawing/2014/main" id="{89C97A68-203D-46AC-88F8-8C03ED8E4BFB}"/>
-                </a:ext>
-              </a:extLst>
-            </p:cNvPr>
-            <p:cNvSpPr/>
-            <p:nvPr/>
-          </p:nvSpPr>
-          <p:spPr>
-            <a:xfrm>
-              <a:off x="865921" y="2591939"/>
-              <a:ext cx="2535570" cy="293864"/>
-            </a:xfrm>
-            <a:prstGeom prst="rect">
-              <a:avLst/>
-            </a:prstGeom>
-            <a:solidFill>
-              <a:srgbClr val="FFEFBD"/>
-            </a:solidFill>
-          </p:spPr>
-          <p:style>
-            <a:lnRef idx="2">
-              <a:schemeClr val="accent4">
-                <a:shade val="50000"/>
-              </a:schemeClr>
-            </a:lnRef>
-            <a:fillRef idx="1">
-              <a:schemeClr val="accent4"/>
-            </a:fillRef>
-            <a:effectRef idx="0">
-              <a:schemeClr val="accent4"/>
-            </a:effectRef>
-            <a:fontRef idx="minor">
-              <a:schemeClr val="lt1"/>
-            </a:fontRef>
-          </p:style>
-          <p:txBody>
-            <a:bodyPr rtlCol="0" anchor="ctr"/>
-            <a:lstStyle/>
-            <a:p>
-              <a:pPr algn="ctr"/>
-              <a:r>
-                <a:rPr lang="en-US" sz="800" dirty="0">
-                  <a:solidFill>
-                    <a:schemeClr val="tx1"/>
-                  </a:solidFill>
-                  <a:latin typeface="Segoe UI" panose="020B0502040204020203" pitchFamily="34" charset="0"/>
-                  <a:cs typeface="Segoe UI" panose="020B0502040204020203" pitchFamily="34" charset="0"/>
-                </a:rPr>
-                <a:t>PowerApps Portal</a:t>
-              </a:r>
-            </a:p>
-          </p:txBody>
-        </p:sp>
-        <p:sp>
-          <p:nvSpPr>
-            <p:cNvPr id="28" name="Rectangle 27">
-              <a:extLst>
-                <a:ext uri="{FF2B5EF4-FFF2-40B4-BE49-F238E27FC236}">
-                  <a16:creationId xmlns:a16="http://schemas.microsoft.com/office/drawing/2014/main" id="{75EE3904-4ADB-4FC1-B45E-1A4FC08106E1}"/>
-                </a:ext>
-              </a:extLst>
-            </p:cNvPr>
-            <p:cNvSpPr/>
-            <p:nvPr/>
-          </p:nvSpPr>
-          <p:spPr>
-            <a:xfrm>
-              <a:off x="865920" y="3315337"/>
-              <a:ext cx="5031911" cy="293864"/>
-            </a:xfrm>
-            <a:prstGeom prst="rect">
-              <a:avLst/>
-            </a:prstGeom>
-            <a:solidFill>
-              <a:srgbClr val="CFDBF0"/>
-            </a:solidFill>
-          </p:spPr>
-          <p:style>
-            <a:lnRef idx="2">
-              <a:schemeClr val="accent1">
-                <a:shade val="50000"/>
-              </a:schemeClr>
-            </a:lnRef>
-            <a:fillRef idx="1">
-              <a:schemeClr val="accent1"/>
-            </a:fillRef>
-            <a:effectRef idx="0">
-              <a:schemeClr val="accent1"/>
-            </a:effectRef>
-            <a:fontRef idx="minor">
-              <a:schemeClr val="lt1"/>
-            </a:fontRef>
-          </p:style>
-          <p:txBody>
-            <a:bodyPr rtlCol="0" anchor="ctr"/>
-            <a:lstStyle/>
-            <a:p>
-              <a:pPr algn="ctr"/>
-              <a:r>
-                <a:rPr lang="en-US" sz="800" dirty="0">
-                  <a:solidFill>
-                    <a:schemeClr val="tx1"/>
-                  </a:solidFill>
-                  <a:latin typeface="Segoe UI" panose="020B0502040204020203" pitchFamily="34" charset="0"/>
-                  <a:cs typeface="Segoe UI" panose="020B0502040204020203" pitchFamily="34" charset="0"/>
-                </a:rPr>
-                <a:t>Education Accelerator Connection Roles</a:t>
-              </a:r>
-            </a:p>
-          </p:txBody>
-        </p:sp>
-      </p:grpSp>
-    </p:spTree>
-    <p:extLst>
-      <p:ext uri="{BB962C8B-B14F-4D97-AF65-F5344CB8AC3E}">
-        <p14:creationId xmlns:p14="http://schemas.microsoft.com/office/powerpoint/2010/main" val="3226864652"/>
       </p:ext>
     </p:extLst>
   </p:cSld>
@@ -16903,6 +17904,57 @@
 </file>
 
 <file path=customXml/item1.xml><?xml version="1.0" encoding="utf-8"?>
+<p:properties xmlns:p="http://schemas.microsoft.com/office/2006/metadata/properties" xmlns:xsi="http://www.w3.org/2001/XMLSchema-instance" xmlns:pc="http://schemas.microsoft.com/office/infopath/2007/PartnerControls">
+  <documentManagement>
+    <SharedWithUsers xmlns="0378db11-4119-45e9-bfb7-0175dfe751a7">
+      <UserInfo>
+        <DisplayName>David Reinhold</DisplayName>
+        <AccountId>26</AccountId>
+        <AccountType/>
+      </UserInfo>
+      <UserInfo>
+        <DisplayName>Martin Wahl</DisplayName>
+        <AccountId>10</AccountId>
+        <AccountType/>
+      </UserInfo>
+      <UserInfo>
+        <DisplayName>Rajya Bhaiya</DisplayName>
+        <AccountId>11</AccountId>
+        <AccountType/>
+      </UserInfo>
+      <UserInfo>
+        <DisplayName>Oleg Ovanesyan</DisplayName>
+        <AccountId>34</AccountId>
+        <AccountType/>
+      </UserInfo>
+      <UserInfo>
+        <DisplayName>Jeff Bernhardt</DisplayName>
+        <AccountId>35</AccountId>
+        <AccountType/>
+      </UserInfo>
+      <UserInfo>
+        <DisplayName>Sara Nagy</DisplayName>
+        <AccountId>20</AccountId>
+        <AccountType/>
+      </UserInfo>
+      <UserInfo>
+        <DisplayName>Bryan Schafer</DisplayName>
+        <AccountId>13</AccountId>
+        <AccountType/>
+      </UserInfo>
+      <UserInfo>
+        <DisplayName>Shiva Rampally</DisplayName>
+        <AccountId>36</AccountId>
+        <AccountType/>
+      </UserInfo>
+    </SharedWithUsers>
+    <_ip_UnifiedCompliancePolicyUIAction xmlns="http://schemas.microsoft.com/sharepoint/v3" xsi:nil="true"/>
+    <_ip_UnifiedCompliancePolicyProperties xmlns="http://schemas.microsoft.com/sharepoint/v3" xsi:nil="true"/>
+  </documentManagement>
+</p:properties>
+</file>
+
+<file path=customXml/item2.xml><?xml version="1.0" encoding="utf-8"?>
 <?mso-contentType ?>
 <FormTemplates xmlns="http://schemas.microsoft.com/sharepoint/v3/contenttype/forms">
   <Display>DocumentLibraryForm</Display>
@@ -16911,7 +17963,7 @@
 </FormTemplates>
 </file>
 
-<file path=customXml/item2.xml><?xml version="1.0" encoding="utf-8"?>
+<file path=customXml/item3.xml><?xml version="1.0" encoding="utf-8"?>
 <ct:contentTypeSchema xmlns:ct="http://schemas.microsoft.com/office/2006/metadata/contentType" xmlns:ma="http://schemas.microsoft.com/office/2006/metadata/properties/metaAttributes" ct:_="" ma:_="" ma:contentTypeName="Document" ma:contentTypeID="0x010100E884C8D4FD641E4692993FAEE6A83C06" ma:contentTypeVersion="12" ma:contentTypeDescription="Create a new document." ma:contentTypeScope="" ma:versionID="5995b25f8fe99baef7c7be72a60e2559">
   <xsd:schema xmlns:xsd="http://www.w3.org/2001/XMLSchema" xmlns:xs="http://www.w3.org/2001/XMLSchema" xmlns:p="http://schemas.microsoft.com/office/2006/metadata/properties" xmlns:ns1="http://schemas.microsoft.com/sharepoint/v3" xmlns:ns2="ee73d4f1-b24e-4ab6-aed5-79c58a2952cf" xmlns:ns3="0378db11-4119-45e9-bfb7-0175dfe751a7" targetNamespace="http://schemas.microsoft.com/office/2006/metadata/properties" ma:root="true" ma:fieldsID="82f71819f9f81108adadf8a497b5062b" ns1:_="" ns2:_="" ns3:_="">
     <xsd:import namespace="http://schemas.microsoft.com/sharepoint/v3"/>
@@ -17133,58 +18185,26 @@
 </ct:contentTypeSchema>
 </file>
 
-<file path=customXml/item3.xml><?xml version="1.0" encoding="utf-8"?>
-<p:properties xmlns:p="http://schemas.microsoft.com/office/2006/metadata/properties" xmlns:xsi="http://www.w3.org/2001/XMLSchema-instance" xmlns:pc="http://schemas.microsoft.com/office/infopath/2007/PartnerControls">
-  <documentManagement>
-    <SharedWithUsers xmlns="0378db11-4119-45e9-bfb7-0175dfe751a7">
-      <UserInfo>
-        <DisplayName>David Reinhold</DisplayName>
-        <AccountId>26</AccountId>
-        <AccountType/>
-      </UserInfo>
-      <UserInfo>
-        <DisplayName>Martin Wahl</DisplayName>
-        <AccountId>10</AccountId>
-        <AccountType/>
-      </UserInfo>
-      <UserInfo>
-        <DisplayName>Rajya Bhaiya</DisplayName>
-        <AccountId>11</AccountId>
-        <AccountType/>
-      </UserInfo>
-      <UserInfo>
-        <DisplayName>Oleg Ovanesyan</DisplayName>
-        <AccountId>34</AccountId>
-        <AccountType/>
-      </UserInfo>
-      <UserInfo>
-        <DisplayName>Jeff Bernhardt</DisplayName>
-        <AccountId>35</AccountId>
-        <AccountType/>
-      </UserInfo>
-      <UserInfo>
-        <DisplayName>Sara Nagy</DisplayName>
-        <AccountId>20</AccountId>
-        <AccountType/>
-      </UserInfo>
-      <UserInfo>
-        <DisplayName>Bryan Schafer</DisplayName>
-        <AccountId>13</AccountId>
-        <AccountType/>
-      </UserInfo>
-      <UserInfo>
-        <DisplayName>Shiva Rampally</DisplayName>
-        <AccountId>36</AccountId>
-        <AccountType/>
-      </UserInfo>
-    </SharedWithUsers>
-    <_ip_UnifiedCompliancePolicyUIAction xmlns="http://schemas.microsoft.com/sharepoint/v3" xsi:nil="true"/>
-    <_ip_UnifiedCompliancePolicyProperties xmlns="http://schemas.microsoft.com/sharepoint/v3" xsi:nil="true"/>
-  </documentManagement>
-</p:properties>
+<file path=customXml/itemProps1.xml><?xml version="1.0" encoding="utf-8"?>
+<ds:datastoreItem xmlns:ds="http://schemas.openxmlformats.org/officeDocument/2006/customXml" ds:itemID="{4E75DC10-FE95-440E-8B09-D2E9D4749B60}">
+  <ds:schemaRefs>
+    <ds:schemaRef ds:uri="http://purl.org/dc/terms/"/>
+    <ds:schemaRef ds:uri="http://schemas.openxmlformats.org/package/2006/metadata/core-properties"/>
+    <ds:schemaRef ds:uri="http://schemas.microsoft.com/office/2006/documentManagement/types"/>
+    <ds:schemaRef ds:uri="http://schemas.microsoft.com/office/infopath/2007/PartnerControls"/>
+    <ds:schemaRef ds:uri="f4540aab-f866-4d74-8143-50dc538ce439"/>
+    <ds:schemaRef ds:uri="http://purl.org/dc/elements/1.1/"/>
+    <ds:schemaRef ds:uri="http://schemas.microsoft.com/office/2006/metadata/properties"/>
+    <ds:schemaRef ds:uri="806fc523-5a2f-400a-a48d-7b960f56b30f"/>
+    <ds:schemaRef ds:uri="http://www.w3.org/XML/1998/namespace"/>
+    <ds:schemaRef ds:uri="http://purl.org/dc/dcmitype/"/>
+    <ds:schemaRef ds:uri="0378db11-4119-45e9-bfb7-0175dfe751a7"/>
+    <ds:schemaRef ds:uri="http://schemas.microsoft.com/sharepoint/v3"/>
+  </ds:schemaRefs>
+</ds:datastoreItem>
 </file>
 
-<file path=customXml/itemProps1.xml><?xml version="1.0" encoding="utf-8"?>
+<file path=customXml/itemProps2.xml><?xml version="1.0" encoding="utf-8"?>
 <ds:datastoreItem xmlns:ds="http://schemas.openxmlformats.org/officeDocument/2006/customXml" ds:itemID="{F82FE9DE-EC4D-4D98-9A33-0EBBC3CF7B34}">
   <ds:schemaRefs>
     <ds:schemaRef ds:uri="http://schemas.microsoft.com/sharepoint/v3/contenttype/forms"/>
@@ -17192,7 +18212,7 @@
 </ds:datastoreItem>
 </file>
 
-<file path=customXml/itemProps2.xml><?xml version="1.0" encoding="utf-8"?>
+<file path=customXml/itemProps3.xml><?xml version="1.0" encoding="utf-8"?>
 <ds:datastoreItem xmlns:ds="http://schemas.openxmlformats.org/officeDocument/2006/customXml" ds:itemID="{EEB4509F-CFA8-43DD-BCC6-B7077650EA49}">
   <ds:schemaRefs>
     <ds:schemaRef ds:uri="http://schemas.microsoft.com/office/2006/metadata/contentType"/>
@@ -17212,21 +18232,8 @@
 </ds:datastoreItem>
 </file>
 
-<file path=customXml/itemProps3.xml><?xml version="1.0" encoding="utf-8"?>
-<ds:datastoreItem xmlns:ds="http://schemas.openxmlformats.org/officeDocument/2006/customXml" ds:itemID="{4E75DC10-FE95-440E-8B09-D2E9D4749B60}">
-  <ds:schemaRefs>
-    <ds:schemaRef ds:uri="http://purl.org/dc/terms/"/>
-    <ds:schemaRef ds:uri="http://schemas.openxmlformats.org/package/2006/metadata/core-properties"/>
-    <ds:schemaRef ds:uri="http://schemas.microsoft.com/office/2006/documentManagement/types"/>
-    <ds:schemaRef ds:uri="http://schemas.microsoft.com/office/infopath/2007/PartnerControls"/>
-    <ds:schemaRef ds:uri="f4540aab-f866-4d74-8143-50dc538ce439"/>
-    <ds:schemaRef ds:uri="http://purl.org/dc/elements/1.1/"/>
-    <ds:schemaRef ds:uri="http://schemas.microsoft.com/office/2006/metadata/properties"/>
-    <ds:schemaRef ds:uri="806fc523-5a2f-400a-a48d-7b960f56b30f"/>
-    <ds:schemaRef ds:uri="http://www.w3.org/XML/1998/namespace"/>
-    <ds:schemaRef ds:uri="http://purl.org/dc/dcmitype/"/>
-    <ds:schemaRef ds:uri="0378db11-4119-45e9-bfb7-0175dfe751a7"/>
-    <ds:schemaRef ds:uri="http://schemas.microsoft.com/sharepoint/v3"/>
-  </ds:schemaRefs>
-</ds:datastoreItem>
+<file path=docMetadata/LabelInfo.xml><?xml version="1.0" encoding="utf-8"?>
+<clbl:labelList xmlns:clbl="http://schemas.microsoft.com/office/2020/mipLabelMetadata">
+  <clbl:label id="{f42aa342-8706-4288-bd11-ebb85995028c}" enabled="1" method="Standard" siteId="{72f988bf-86f1-41af-91ab-2d7cd011db47}" contentBits="0" removed="0"/>
+</clbl:labelList>
 </file>
</xml_diff>